<commit_message>
Practice code for Chapter # 20-42 added
</commit_message>
<xml_diff>
--- a/javascript/ch#15-20/Presentation.pptx
+++ b/javascript/ch#15-20/Presentation.pptx
@@ -168,7 +168,7 @@
           </a:lstStyle>
           <a:p>
             <a:r>
-              <a:rPr lang="en-US" smtClean="0"/>
+              <a:rPr lang="en-US"/>
               <a:t>Click to edit Master title style</a:t>
             </a:r>
             <a:endParaRPr lang="en-US" dirty="0"/>
@@ -288,7 +288,7 @@
           </a:lstStyle>
           <a:p>
             <a:r>
-              <a:rPr lang="en-US" smtClean="0"/>
+              <a:rPr lang="en-US"/>
               <a:t>Click to edit Master subtitle style</a:t>
             </a:r>
             <a:endParaRPr lang="en-US" dirty="0"/>
@@ -312,7 +312,7 @@
           <a:p>
             <a:fld id="{73C487FA-A9A8-4016-AD9D-9097715CEE64}" type="datetimeFigureOut">
               <a:rPr lang="en-US" smtClean="0"/>
-              <a:t>7/21/2018</a:t>
+              <a:t>9/28/2019</a:t>
             </a:fld>
             <a:endParaRPr lang="en-US"/>
           </a:p>
@@ -504,7 +504,7 @@
           </a:lstStyle>
           <a:p>
             <a:r>
-              <a:rPr lang="en-US" smtClean="0"/>
+              <a:rPr lang="en-US"/>
               <a:t>Click to edit Master title style</a:t>
             </a:r>
             <a:endParaRPr lang="en-US" dirty="0"/>
@@ -627,7 +627,7 @@
           <a:p>
             <a:pPr lvl="0"/>
             <a:r>
-              <a:rPr lang="en-US" smtClean="0"/>
+              <a:rPr lang="en-US"/>
               <a:t>Edit Master text styles</a:t>
             </a:r>
           </a:p>
@@ -650,7 +650,7 @@
           <a:p>
             <a:fld id="{73C487FA-A9A8-4016-AD9D-9097715CEE64}" type="datetimeFigureOut">
               <a:rPr lang="en-US" smtClean="0"/>
-              <a:t>7/21/2018</a:t>
+              <a:t>9/28/2019</a:t>
             </a:fld>
             <a:endParaRPr lang="en-US"/>
           </a:p>
@@ -842,7 +842,7 @@
           </a:lstStyle>
           <a:p>
             <a:r>
-              <a:rPr lang="en-US" smtClean="0"/>
+              <a:rPr lang="en-US"/>
               <a:t>Click to edit Master title style</a:t>
             </a:r>
             <a:endParaRPr lang="en-US" dirty="0"/>
@@ -906,7 +906,7 @@
           <a:p>
             <a:pPr lvl="0"/>
             <a:r>
-              <a:rPr lang="en-US" smtClean="0"/>
+              <a:rPr lang="en-US"/>
               <a:t>Edit Master text styles</a:t>
             </a:r>
           </a:p>
@@ -1028,7 +1028,7 @@
           <a:p>
             <a:pPr lvl="0"/>
             <a:r>
-              <a:rPr lang="en-US" smtClean="0"/>
+              <a:rPr lang="en-US"/>
               <a:t>Edit Master text styles</a:t>
             </a:r>
           </a:p>
@@ -1051,7 +1051,7 @@
           <a:p>
             <a:fld id="{73C487FA-A9A8-4016-AD9D-9097715CEE64}" type="datetimeFigureOut">
               <a:rPr lang="en-US" smtClean="0"/>
-              <a:t>7/21/2018</a:t>
+              <a:t>9/28/2019</a:t>
             </a:fld>
             <a:endParaRPr lang="en-US"/>
           </a:p>
@@ -1319,7 +1319,7 @@
           </a:lstStyle>
           <a:p>
             <a:r>
-              <a:rPr lang="en-US" smtClean="0"/>
+              <a:rPr lang="en-US"/>
               <a:t>Click to edit Master title style</a:t>
             </a:r>
             <a:endParaRPr lang="en-US" dirty="0"/>
@@ -1364,7 +1364,7 @@
               <a:buNone/>
             </a:pPr>
             <a:r>
-              <a:rPr lang="en-US" smtClean="0"/>
+              <a:rPr lang="en-US"/>
               <a:t>Edit Master text styles</a:t>
             </a:r>
           </a:p>
@@ -1387,7 +1387,7 @@
           <a:p>
             <a:fld id="{73C487FA-A9A8-4016-AD9D-9097715CEE64}" type="datetimeFigureOut">
               <a:rPr lang="en-US" smtClean="0"/>
-              <a:t>7/21/2018</a:t>
+              <a:t>9/28/2019</a:t>
             </a:fld>
             <a:endParaRPr lang="en-US"/>
           </a:p>
@@ -1579,7 +1579,7 @@
           </a:lstStyle>
           <a:p>
             <a:r>
-              <a:rPr lang="en-US" smtClean="0"/>
+              <a:rPr lang="en-US"/>
               <a:t>Click to edit Master title style</a:t>
             </a:r>
             <a:endParaRPr lang="en-US" dirty="0"/>
@@ -1640,7 +1640,7 @@
           <a:p>
             <a:pPr lvl="0"/>
             <a:r>
-              <a:rPr lang="en-US" smtClean="0"/>
+              <a:rPr lang="en-US"/>
               <a:t>Edit Master text styles</a:t>
             </a:r>
           </a:p>
@@ -1684,7 +1684,7 @@
               <a:buNone/>
             </a:pPr>
             <a:r>
-              <a:rPr lang="en-US" smtClean="0"/>
+              <a:rPr lang="en-US"/>
               <a:t>Edit Master text styles</a:t>
             </a:r>
           </a:p>
@@ -1707,7 +1707,7 @@
           <a:p>
             <a:fld id="{73C487FA-A9A8-4016-AD9D-9097715CEE64}" type="datetimeFigureOut">
               <a:rPr lang="en-US" smtClean="0"/>
-              <a:t>7/21/2018</a:t>
+              <a:t>9/28/2019</a:t>
             </a:fld>
             <a:endParaRPr lang="en-US"/>
           </a:p>
@@ -1975,7 +1975,7 @@
           </a:lstStyle>
           <a:p>
             <a:r>
-              <a:rPr lang="en-US" smtClean="0"/>
+              <a:rPr lang="en-US"/>
               <a:t>Click to edit Master title style</a:t>
             </a:r>
             <a:endParaRPr lang="en-US" dirty="0"/>
@@ -2036,7 +2036,7 @@
           <a:p>
             <a:pPr lvl="0"/>
             <a:r>
-              <a:rPr lang="en-US" smtClean="0"/>
+              <a:rPr lang="en-US"/>
               <a:t>Edit Master text styles</a:t>
             </a:r>
           </a:p>
@@ -2080,7 +2080,7 @@
               <a:buNone/>
             </a:pPr>
             <a:r>
-              <a:rPr lang="en-US" smtClean="0"/>
+              <a:rPr lang="en-US"/>
               <a:t>Edit Master text styles</a:t>
             </a:r>
           </a:p>
@@ -2103,7 +2103,7 @@
           <a:p>
             <a:fld id="{73C487FA-A9A8-4016-AD9D-9097715CEE64}" type="datetimeFigureOut">
               <a:rPr lang="en-US" smtClean="0"/>
-              <a:t>7/21/2018</a:t>
+              <a:t>9/28/2019</a:t>
             </a:fld>
             <a:endParaRPr lang="en-US"/>
           </a:p>
@@ -2284,7 +2284,7 @@
           <a:lstStyle/>
           <a:p>
             <a:r>
-              <a:rPr lang="en-US" smtClean="0"/>
+              <a:rPr lang="en-US"/>
               <a:t>Click to edit Master title style</a:t>
             </a:r>
             <a:endParaRPr lang="en-US" dirty="0"/>
@@ -2308,35 +2308,35 @@
           <a:p>
             <a:pPr lvl="0"/>
             <a:r>
-              <a:rPr lang="en-US" smtClean="0"/>
+              <a:rPr lang="en-US"/>
               <a:t>Edit Master text styles</a:t>
             </a:r>
           </a:p>
           <a:p>
             <a:pPr lvl="1"/>
             <a:r>
-              <a:rPr lang="en-US" smtClean="0"/>
+              <a:rPr lang="en-US"/>
               <a:t>Second level</a:t>
             </a:r>
           </a:p>
           <a:p>
             <a:pPr lvl="2"/>
             <a:r>
-              <a:rPr lang="en-US" smtClean="0"/>
+              <a:rPr lang="en-US"/>
               <a:t>Third level</a:t>
             </a:r>
           </a:p>
           <a:p>
             <a:pPr lvl="3"/>
             <a:r>
-              <a:rPr lang="en-US" smtClean="0"/>
+              <a:rPr lang="en-US"/>
               <a:t>Fourth level</a:t>
             </a:r>
           </a:p>
           <a:p>
             <a:pPr lvl="4"/>
             <a:r>
-              <a:rPr lang="en-US" smtClean="0"/>
+              <a:rPr lang="en-US"/>
               <a:t>Fifth level</a:t>
             </a:r>
             <a:endParaRPr lang="en-US" dirty="0"/>
@@ -2360,7 +2360,7 @@
           <a:p>
             <a:fld id="{73C487FA-A9A8-4016-AD9D-9097715CEE64}" type="datetimeFigureOut">
               <a:rPr lang="en-US" smtClean="0"/>
-              <a:t>7/21/2018</a:t>
+              <a:t>9/28/2019</a:t>
             </a:fld>
             <a:endParaRPr lang="en-US"/>
           </a:p>
@@ -2541,7 +2541,7 @@
           <a:lstStyle/>
           <a:p>
             <a:r>
-              <a:rPr lang="en-US" smtClean="0"/>
+              <a:rPr lang="en-US"/>
               <a:t>Click to edit Master title style</a:t>
             </a:r>
             <a:endParaRPr lang="en-US" dirty="0"/>
@@ -2570,35 +2570,35 @@
           <a:p>
             <a:pPr lvl="0"/>
             <a:r>
-              <a:rPr lang="en-US" smtClean="0"/>
+              <a:rPr lang="en-US"/>
               <a:t>Edit Master text styles</a:t>
             </a:r>
           </a:p>
           <a:p>
             <a:pPr lvl="1"/>
             <a:r>
-              <a:rPr lang="en-US" smtClean="0"/>
+              <a:rPr lang="en-US"/>
               <a:t>Second level</a:t>
             </a:r>
           </a:p>
           <a:p>
             <a:pPr lvl="2"/>
             <a:r>
-              <a:rPr lang="en-US" smtClean="0"/>
+              <a:rPr lang="en-US"/>
               <a:t>Third level</a:t>
             </a:r>
           </a:p>
           <a:p>
             <a:pPr lvl="3"/>
             <a:r>
-              <a:rPr lang="en-US" smtClean="0"/>
+              <a:rPr lang="en-US"/>
               <a:t>Fourth level</a:t>
             </a:r>
           </a:p>
           <a:p>
             <a:pPr lvl="4"/>
             <a:r>
-              <a:rPr lang="en-US" smtClean="0"/>
+              <a:rPr lang="en-US"/>
               <a:t>Fifth level</a:t>
             </a:r>
             <a:endParaRPr lang="en-US" dirty="0"/>
@@ -2622,7 +2622,7 @@
           <a:p>
             <a:fld id="{73C487FA-A9A8-4016-AD9D-9097715CEE64}" type="datetimeFigureOut">
               <a:rPr lang="en-US" smtClean="0"/>
-              <a:t>7/21/2018</a:t>
+              <a:t>9/28/2019</a:t>
             </a:fld>
             <a:endParaRPr lang="en-US"/>
           </a:p>
@@ -2803,7 +2803,7 @@
           <a:lstStyle/>
           <a:p>
             <a:r>
-              <a:rPr lang="en-US" smtClean="0"/>
+              <a:rPr lang="en-US"/>
               <a:t>Click to edit Master title style</a:t>
             </a:r>
             <a:endParaRPr lang="en-US" dirty="0"/>
@@ -2832,35 +2832,35 @@
           <a:p>
             <a:pPr lvl="0"/>
             <a:r>
-              <a:rPr lang="en-US" smtClean="0"/>
+              <a:rPr lang="en-US"/>
               <a:t>Edit Master text styles</a:t>
             </a:r>
           </a:p>
           <a:p>
             <a:pPr lvl="1"/>
             <a:r>
-              <a:rPr lang="en-US" smtClean="0"/>
+              <a:rPr lang="en-US"/>
               <a:t>Second level</a:t>
             </a:r>
           </a:p>
           <a:p>
             <a:pPr lvl="2"/>
             <a:r>
-              <a:rPr lang="en-US" smtClean="0"/>
+              <a:rPr lang="en-US"/>
               <a:t>Third level</a:t>
             </a:r>
           </a:p>
           <a:p>
             <a:pPr lvl="3"/>
             <a:r>
-              <a:rPr lang="en-US" smtClean="0"/>
+              <a:rPr lang="en-US"/>
               <a:t>Fourth level</a:t>
             </a:r>
           </a:p>
           <a:p>
             <a:pPr lvl="4"/>
             <a:r>
-              <a:rPr lang="en-US" smtClean="0"/>
+              <a:rPr lang="en-US"/>
               <a:t>Fifth level</a:t>
             </a:r>
             <a:endParaRPr lang="en-US" dirty="0"/>
@@ -2884,7 +2884,7 @@
           <a:p>
             <a:fld id="{73C487FA-A9A8-4016-AD9D-9097715CEE64}" type="datetimeFigureOut">
               <a:rPr lang="en-US" smtClean="0"/>
-              <a:t>7/21/2018</a:t>
+              <a:t>9/28/2019</a:t>
             </a:fld>
             <a:endParaRPr lang="en-US"/>
           </a:p>
@@ -3069,7 +3069,7 @@
           </a:lstStyle>
           <a:p>
             <a:r>
-              <a:rPr lang="en-US" smtClean="0"/>
+              <a:rPr lang="en-US"/>
               <a:t>Click to edit Master title style</a:t>
             </a:r>
             <a:endParaRPr lang="en-US" dirty="0"/>
@@ -3190,7 +3190,7 @@
           <a:p>
             <a:pPr lvl="0"/>
             <a:r>
-              <a:rPr lang="en-US" smtClean="0"/>
+              <a:rPr lang="en-US"/>
               <a:t>Edit Master text styles</a:t>
             </a:r>
           </a:p>
@@ -3213,7 +3213,7 @@
           <a:p>
             <a:fld id="{73C487FA-A9A8-4016-AD9D-9097715CEE64}" type="datetimeFigureOut">
               <a:rPr lang="en-US" smtClean="0"/>
-              <a:t>7/21/2018</a:t>
+              <a:t>9/28/2019</a:t>
             </a:fld>
             <a:endParaRPr lang="en-US"/>
           </a:p>
@@ -3394,7 +3394,7 @@
           <a:lstStyle/>
           <a:p>
             <a:r>
-              <a:rPr lang="en-US" smtClean="0"/>
+              <a:rPr lang="en-US"/>
               <a:t>Click to edit Master title style</a:t>
             </a:r>
             <a:endParaRPr lang="en-US" dirty="0"/>
@@ -3425,35 +3425,35 @@
           <a:p>
             <a:pPr lvl="0"/>
             <a:r>
-              <a:rPr lang="en-US" smtClean="0"/>
+              <a:rPr lang="en-US"/>
               <a:t>Edit Master text styles</a:t>
             </a:r>
           </a:p>
           <a:p>
             <a:pPr lvl="1"/>
             <a:r>
-              <a:rPr lang="en-US" smtClean="0"/>
+              <a:rPr lang="en-US"/>
               <a:t>Second level</a:t>
             </a:r>
           </a:p>
           <a:p>
             <a:pPr lvl="2"/>
             <a:r>
-              <a:rPr lang="en-US" smtClean="0"/>
+              <a:rPr lang="en-US"/>
               <a:t>Third level</a:t>
             </a:r>
           </a:p>
           <a:p>
             <a:pPr lvl="3"/>
             <a:r>
-              <a:rPr lang="en-US" smtClean="0"/>
+              <a:rPr lang="en-US"/>
               <a:t>Fourth level</a:t>
             </a:r>
           </a:p>
           <a:p>
             <a:pPr lvl="4"/>
             <a:r>
-              <a:rPr lang="en-US" smtClean="0"/>
+              <a:rPr lang="en-US"/>
               <a:t>Fifth level</a:t>
             </a:r>
             <a:endParaRPr lang="en-US" dirty="0"/>
@@ -3484,35 +3484,35 @@
           <a:p>
             <a:pPr lvl="0"/>
             <a:r>
-              <a:rPr lang="en-US" smtClean="0"/>
+              <a:rPr lang="en-US"/>
               <a:t>Edit Master text styles</a:t>
             </a:r>
           </a:p>
           <a:p>
             <a:pPr lvl="1"/>
             <a:r>
-              <a:rPr lang="en-US" smtClean="0"/>
+              <a:rPr lang="en-US"/>
               <a:t>Second level</a:t>
             </a:r>
           </a:p>
           <a:p>
             <a:pPr lvl="2"/>
             <a:r>
-              <a:rPr lang="en-US" smtClean="0"/>
+              <a:rPr lang="en-US"/>
               <a:t>Third level</a:t>
             </a:r>
           </a:p>
           <a:p>
             <a:pPr lvl="3"/>
             <a:r>
-              <a:rPr lang="en-US" smtClean="0"/>
+              <a:rPr lang="en-US"/>
               <a:t>Fourth level</a:t>
             </a:r>
           </a:p>
           <a:p>
             <a:pPr lvl="4"/>
             <a:r>
-              <a:rPr lang="en-US" smtClean="0"/>
+              <a:rPr lang="en-US"/>
               <a:t>Fifth level</a:t>
             </a:r>
             <a:endParaRPr lang="en-US" dirty="0"/>
@@ -3536,7 +3536,7 @@
           <a:p>
             <a:fld id="{73C487FA-A9A8-4016-AD9D-9097715CEE64}" type="datetimeFigureOut">
               <a:rPr lang="en-US" smtClean="0"/>
-              <a:t>7/21/2018</a:t>
+              <a:t>9/28/2019</a:t>
             </a:fld>
             <a:endParaRPr lang="en-US"/>
           </a:p>
@@ -3717,7 +3717,7 @@
           <a:lstStyle/>
           <a:p>
             <a:r>
-              <a:rPr lang="en-US" smtClean="0"/>
+              <a:rPr lang="en-US"/>
               <a:t>Click to edit Master title style</a:t>
             </a:r>
             <a:endParaRPr lang="en-US" dirty="0"/>
@@ -3785,7 +3785,7 @@
           <a:p>
             <a:pPr lvl="0"/>
             <a:r>
-              <a:rPr lang="en-US" smtClean="0"/>
+              <a:rPr lang="en-US"/>
               <a:t>Edit Master text styles</a:t>
             </a:r>
           </a:p>
@@ -3815,35 +3815,35 @@
           <a:p>
             <a:pPr lvl="0"/>
             <a:r>
-              <a:rPr lang="en-US" smtClean="0"/>
+              <a:rPr lang="en-US"/>
               <a:t>Edit Master text styles</a:t>
             </a:r>
           </a:p>
           <a:p>
             <a:pPr lvl="1"/>
             <a:r>
-              <a:rPr lang="en-US" smtClean="0"/>
+              <a:rPr lang="en-US"/>
               <a:t>Second level</a:t>
             </a:r>
           </a:p>
           <a:p>
             <a:pPr lvl="2"/>
             <a:r>
-              <a:rPr lang="en-US" smtClean="0"/>
+              <a:rPr lang="en-US"/>
               <a:t>Third level</a:t>
             </a:r>
           </a:p>
           <a:p>
             <a:pPr lvl="3"/>
             <a:r>
-              <a:rPr lang="en-US" smtClean="0"/>
+              <a:rPr lang="en-US"/>
               <a:t>Fourth level</a:t>
             </a:r>
           </a:p>
           <a:p>
             <a:pPr lvl="4"/>
             <a:r>
-              <a:rPr lang="en-US" smtClean="0"/>
+              <a:rPr lang="en-US"/>
               <a:t>Fifth level</a:t>
             </a:r>
             <a:endParaRPr lang="en-US" dirty="0"/>
@@ -3911,7 +3911,7 @@
           <a:p>
             <a:pPr lvl="0"/>
             <a:r>
-              <a:rPr lang="en-US" smtClean="0"/>
+              <a:rPr lang="en-US"/>
               <a:t>Edit Master text styles</a:t>
             </a:r>
           </a:p>
@@ -3941,35 +3941,35 @@
           <a:p>
             <a:pPr lvl="0"/>
             <a:r>
-              <a:rPr lang="en-US" smtClean="0"/>
+              <a:rPr lang="en-US"/>
               <a:t>Edit Master text styles</a:t>
             </a:r>
           </a:p>
           <a:p>
             <a:pPr lvl="1"/>
             <a:r>
-              <a:rPr lang="en-US" smtClean="0"/>
+              <a:rPr lang="en-US"/>
               <a:t>Second level</a:t>
             </a:r>
           </a:p>
           <a:p>
             <a:pPr lvl="2"/>
             <a:r>
-              <a:rPr lang="en-US" smtClean="0"/>
+              <a:rPr lang="en-US"/>
               <a:t>Third level</a:t>
             </a:r>
           </a:p>
           <a:p>
             <a:pPr lvl="3"/>
             <a:r>
-              <a:rPr lang="en-US" smtClean="0"/>
+              <a:rPr lang="en-US"/>
               <a:t>Fourth level</a:t>
             </a:r>
           </a:p>
           <a:p>
             <a:pPr lvl="4"/>
             <a:r>
-              <a:rPr lang="en-US" smtClean="0"/>
+              <a:rPr lang="en-US"/>
               <a:t>Fifth level</a:t>
             </a:r>
             <a:endParaRPr lang="en-US" dirty="0"/>
@@ -3993,7 +3993,7 @@
           <a:p>
             <a:fld id="{73C487FA-A9A8-4016-AD9D-9097715CEE64}" type="datetimeFigureOut">
               <a:rPr lang="en-US" smtClean="0"/>
-              <a:t>7/21/2018</a:t>
+              <a:t>9/28/2019</a:t>
             </a:fld>
             <a:endParaRPr lang="en-US"/>
           </a:p>
@@ -4174,7 +4174,7 @@
           <a:lstStyle/>
           <a:p>
             <a:r>
-              <a:rPr lang="en-US" smtClean="0"/>
+              <a:rPr lang="en-US"/>
               <a:t>Click to edit Master title style</a:t>
             </a:r>
             <a:endParaRPr lang="en-US" dirty="0"/>
@@ -4198,7 +4198,7 @@
           <a:p>
             <a:fld id="{73C487FA-A9A8-4016-AD9D-9097715CEE64}" type="datetimeFigureOut">
               <a:rPr lang="en-US" smtClean="0"/>
-              <a:t>7/21/2018</a:t>
+              <a:t>9/28/2019</a:t>
             </a:fld>
             <a:endParaRPr lang="en-US"/>
           </a:p>
@@ -4375,7 +4375,7 @@
           <a:p>
             <a:fld id="{73C487FA-A9A8-4016-AD9D-9097715CEE64}" type="datetimeFigureOut">
               <a:rPr lang="en-US" smtClean="0"/>
-              <a:t>7/21/2018</a:t>
+              <a:t>9/28/2019</a:t>
             </a:fld>
             <a:endParaRPr lang="en-US"/>
           </a:p>
@@ -4560,7 +4560,7 @@
           </a:lstStyle>
           <a:p>
             <a:r>
-              <a:rPr lang="en-US" smtClean="0"/>
+              <a:rPr lang="en-US"/>
               <a:t>Click to edit Master title style</a:t>
             </a:r>
             <a:endParaRPr lang="en-US" dirty="0"/>
@@ -4591,35 +4591,35 @@
           <a:p>
             <a:pPr lvl="0"/>
             <a:r>
-              <a:rPr lang="en-US" smtClean="0"/>
+              <a:rPr lang="en-US"/>
               <a:t>Edit Master text styles</a:t>
             </a:r>
           </a:p>
           <a:p>
             <a:pPr lvl="1"/>
             <a:r>
-              <a:rPr lang="en-US" smtClean="0"/>
+              <a:rPr lang="en-US"/>
               <a:t>Second level</a:t>
             </a:r>
           </a:p>
           <a:p>
             <a:pPr lvl="2"/>
             <a:r>
-              <a:rPr lang="en-US" smtClean="0"/>
+              <a:rPr lang="en-US"/>
               <a:t>Third level</a:t>
             </a:r>
           </a:p>
           <a:p>
             <a:pPr lvl="3"/>
             <a:r>
-              <a:rPr lang="en-US" smtClean="0"/>
+              <a:rPr lang="en-US"/>
               <a:t>Fourth level</a:t>
             </a:r>
           </a:p>
           <a:p>
             <a:pPr lvl="4"/>
             <a:r>
-              <a:rPr lang="en-US" smtClean="0"/>
+              <a:rPr lang="en-US"/>
               <a:t>Fifth level</a:t>
             </a:r>
             <a:endParaRPr lang="en-US" dirty="0"/>
@@ -4685,7 +4685,7 @@
           <a:p>
             <a:pPr lvl="0"/>
             <a:r>
-              <a:rPr lang="en-US" smtClean="0"/>
+              <a:rPr lang="en-US"/>
               <a:t>Edit Master text styles</a:t>
             </a:r>
           </a:p>
@@ -4708,7 +4708,7 @@
           <a:p>
             <a:fld id="{73C487FA-A9A8-4016-AD9D-9097715CEE64}" type="datetimeFigureOut">
               <a:rPr lang="en-US" smtClean="0"/>
-              <a:t>7/21/2018</a:t>
+              <a:t>9/28/2019</a:t>
             </a:fld>
             <a:endParaRPr lang="en-US"/>
           </a:p>
@@ -4895,7 +4895,7 @@
           </a:lstStyle>
           <a:p>
             <a:r>
-              <a:rPr lang="en-US" smtClean="0"/>
+              <a:rPr lang="en-US"/>
               <a:t>Click to edit Master title style</a:t>
             </a:r>
             <a:endParaRPr lang="en-US" dirty="0"/>
@@ -4962,7 +4962,7 @@
           </a:lstStyle>
           <a:p>
             <a:r>
-              <a:rPr lang="en-US" smtClean="0"/>
+              <a:rPr lang="en-US"/>
               <a:t>Click icon to add picture</a:t>
             </a:r>
             <a:endParaRPr lang="en-US" dirty="0"/>
@@ -5030,7 +5030,7 @@
           <a:p>
             <a:pPr lvl="0"/>
             <a:r>
-              <a:rPr lang="en-US" smtClean="0"/>
+              <a:rPr lang="en-US"/>
               <a:t>Edit Master text styles</a:t>
             </a:r>
           </a:p>
@@ -5053,7 +5053,7 @@
           <a:p>
             <a:fld id="{73C487FA-A9A8-4016-AD9D-9097715CEE64}" type="datetimeFigureOut">
               <a:rPr lang="en-US" smtClean="0"/>
-              <a:t>7/21/2018</a:t>
+              <a:t>9/28/2019</a:t>
             </a:fld>
             <a:endParaRPr lang="en-US"/>
           </a:p>
@@ -7066,7 +7066,7 @@
           <a:lstStyle/>
           <a:p>
             <a:r>
-              <a:rPr lang="en-US" smtClean="0"/>
+              <a:rPr lang="en-US"/>
               <a:t>Click to edit Master title style</a:t>
             </a:r>
             <a:endParaRPr lang="en-US" dirty="0"/>
@@ -7100,35 +7100,35 @@
           <a:p>
             <a:pPr lvl="0"/>
             <a:r>
-              <a:rPr lang="en-US" smtClean="0"/>
+              <a:rPr lang="en-US"/>
               <a:t>Edit Master text styles</a:t>
             </a:r>
           </a:p>
           <a:p>
             <a:pPr lvl="1"/>
             <a:r>
-              <a:rPr lang="en-US" smtClean="0"/>
+              <a:rPr lang="en-US"/>
               <a:t>Second level</a:t>
             </a:r>
           </a:p>
           <a:p>
             <a:pPr lvl="2"/>
             <a:r>
-              <a:rPr lang="en-US" smtClean="0"/>
+              <a:rPr lang="en-US"/>
               <a:t>Third level</a:t>
             </a:r>
           </a:p>
           <a:p>
             <a:pPr lvl="3"/>
             <a:r>
-              <a:rPr lang="en-US" smtClean="0"/>
+              <a:rPr lang="en-US"/>
               <a:t>Fourth level</a:t>
             </a:r>
           </a:p>
           <a:p>
             <a:pPr lvl="4"/>
             <a:r>
-              <a:rPr lang="en-US" smtClean="0"/>
+              <a:rPr lang="en-US"/>
               <a:t>Fifth level</a:t>
             </a:r>
             <a:endParaRPr lang="en-US" dirty="0"/>
@@ -7170,7 +7170,7 @@
           <a:p>
             <a:fld id="{73C487FA-A9A8-4016-AD9D-9097715CEE64}" type="datetimeFigureOut">
               <a:rPr lang="en-US" smtClean="0"/>
-              <a:t>7/21/2018</a:t>
+              <a:t>9/28/2019</a:t>
             </a:fld>
             <a:endParaRPr lang="en-US"/>
           </a:p>
@@ -7769,10 +7769,9 @@
           <a:lstStyle/>
           <a:p>
             <a:r>
-              <a:rPr lang="en-US" dirty="0" smtClean="0"/>
+              <a:rPr lang="en-US" dirty="0"/>
               <a:t>Loops</a:t>
             </a:r>
-            <a:endParaRPr lang="en-US" dirty="0"/>
           </a:p>
         </p:txBody>
       </p:sp>
@@ -7803,72 +7802,66 @@
             </a:pPr>
             <a:r>
               <a:rPr lang="en-US" sz="2000" dirty="0"/>
-              <a:t>Loops are handy, if you want to run the same code over and over again, each time with a different value</a:t>
-            </a:r>
-            <a:r>
-              <a:rPr lang="en-US" sz="2000" dirty="0" smtClean="0"/>
-              <a:t>.</a:t>
+              <a:t>Loops are handy, if you want to run the same code over and over again, each time with a different value.</a:t>
             </a:r>
           </a:p>
           <a:p>
             <a:pPr marL="0" indent="0">
               <a:buNone/>
             </a:pPr>
-            <a:endParaRPr lang="en-US" sz="2000" dirty="0" smtClean="0">
-              <a:latin typeface="Consolas" panose="020B0609020204030204" pitchFamily="49" charset="0"/>
-              <a:cs typeface="Calibri" panose="020F0502020204030204" pitchFamily="34" charset="0"/>
-            </a:endParaRPr>
-          </a:p>
-          <a:p>
-            <a:pPr marL="0" indent="0">
-              <a:buNone/>
-            </a:pPr>
-            <a:r>
-              <a:rPr lang="en-US" dirty="0"/>
-              <a:t>JavaScript supports different kinds of loops:</a:t>
-            </a:r>
             <a:endParaRPr lang="en-US" sz="2000" dirty="0">
               <a:latin typeface="Consolas" panose="020B0609020204030204" pitchFamily="49" charset="0"/>
               <a:cs typeface="Calibri" panose="020F0502020204030204" pitchFamily="34" charset="0"/>
             </a:endParaRPr>
           </a:p>
           <a:p>
-            <a:r>
-              <a:rPr lang="en-US" b="1" dirty="0" smtClean="0"/>
+            <a:pPr marL="0" indent="0">
+              <a:buNone/>
+            </a:pPr>
+            <a:r>
+              <a:rPr lang="en-US" dirty="0"/>
+              <a:t>JavaScript supports different kinds of loops:</a:t>
+            </a:r>
+            <a:endParaRPr lang="en-US" sz="2000" dirty="0">
+              <a:latin typeface="Consolas" panose="020B0609020204030204" pitchFamily="49" charset="0"/>
+              <a:cs typeface="Calibri" panose="020F0502020204030204" pitchFamily="34" charset="0"/>
+            </a:endParaRPr>
+          </a:p>
+          <a:p>
+            <a:r>
+              <a:rPr lang="en-US" b="1" dirty="0"/>
               <a:t>for</a:t>
             </a:r>
           </a:p>
           <a:p>
             <a:r>
-              <a:rPr lang="en-US" b="1" dirty="0" err="1" smtClean="0"/>
+              <a:rPr lang="en-US" b="1" dirty="0" err="1"/>
               <a:t>foreach</a:t>
             </a:r>
             <a:r>
               <a:rPr lang="en-US" b="1" dirty="0"/>
               <a:t> </a:t>
             </a:r>
-            <a:endParaRPr lang="en-US" b="1" dirty="0" smtClean="0"/>
-          </a:p>
-          <a:p>
-            <a:r>
-              <a:rPr lang="en-US" b="1" dirty="0" smtClean="0"/>
+          </a:p>
+          <a:p>
+            <a:r>
+              <a:rPr lang="en-US" b="1" dirty="0"/>
               <a:t>for/in</a:t>
             </a:r>
-            <a:endParaRPr lang="en-US" b="1" dirty="0"/>
-          </a:p>
-          <a:p>
-            <a:r>
-              <a:rPr lang="en-US" b="1" dirty="0" smtClean="0"/>
+          </a:p>
+          <a:p>
+            <a:r>
+              <a:rPr lang="en-US" b="1" dirty="0"/>
               <a:t>while</a:t>
             </a:r>
             <a:endParaRPr lang="en-US" dirty="0"/>
           </a:p>
           <a:p>
             <a:r>
-              <a:rPr lang="en-US" b="1" dirty="0" smtClean="0"/>
+              <a:rPr lang="en-US" b="1" dirty="0"/>
               <a:t>do/while</a:t>
             </a:r>
-            <a:endParaRPr lang="en-US" sz="2000" dirty="0" smtClean="0">
+            <a:endParaRPr lang="en-US" sz="2000" dirty="0">
               <a:latin typeface="Consolas" panose="020B0609020204030204" pitchFamily="49" charset="0"/>
               <a:cs typeface="Calibri" panose="020F0502020204030204" pitchFamily="34" charset="0"/>
             </a:endParaRPr>
@@ -7898,10 +7891,9 @@
           <a:lstStyle/>
           <a:p>
             <a:r>
-              <a:rPr lang="en-US" dirty="0" smtClean="0"/>
+              <a:rPr lang="en-US" dirty="0"/>
               <a:t>Muhammad Umar Ahmad</a:t>
             </a:r>
-            <a:endParaRPr lang="en-US" dirty="0"/>
           </a:p>
         </p:txBody>
       </p:sp>
@@ -7956,10 +7948,9 @@
           <a:lstStyle/>
           <a:p>
             <a:r>
-              <a:rPr lang="en-US" dirty="0" smtClean="0"/>
+              <a:rPr lang="en-US" dirty="0"/>
               <a:t>for loop</a:t>
             </a:r>
-            <a:endParaRPr lang="en-US" dirty="0"/>
           </a:p>
         </p:txBody>
       </p:sp>
@@ -7990,18 +7981,14 @@
             </a:pPr>
             <a:r>
               <a:rPr lang="en-US" dirty="0"/>
-              <a:t>The for loop has the following syntax</a:t>
-            </a:r>
-            <a:r>
-              <a:rPr lang="en-US" dirty="0" smtClean="0"/>
-              <a:t>:</a:t>
+              <a:t>The for loop has the following syntax:</a:t>
             </a:r>
           </a:p>
           <a:p>
             <a:pPr marL="0" indent="0">
               <a:buNone/>
             </a:pPr>
-            <a:endParaRPr lang="en-US" sz="2000" dirty="0" smtClean="0">
+            <a:endParaRPr lang="en-US" sz="2000" dirty="0">
               <a:latin typeface="Consolas" panose="020B0609020204030204" pitchFamily="49" charset="0"/>
               <a:cs typeface="Calibri" panose="020F0502020204030204" pitchFamily="34" charset="0"/>
             </a:endParaRPr>
@@ -8014,16 +8001,10 @@
               <a:rPr lang="en-US" dirty="0">
                 <a:latin typeface="Consolas" panose="020B0609020204030204" pitchFamily="49" charset="0"/>
               </a:rPr>
-              <a:t>for </a:t>
-            </a:r>
-            <a:r>
-              <a:rPr lang="en-US" dirty="0" smtClean="0">
-                <a:latin typeface="Consolas" panose="020B0609020204030204" pitchFamily="49" charset="0"/>
-              </a:rPr>
-              <a:t>(</a:t>
-            </a:r>
-            <a:r>
-              <a:rPr lang="en-US" b="1" i="1" dirty="0" smtClean="0">
+              <a:t>for (</a:t>
+            </a:r>
+            <a:r>
+              <a:rPr lang="en-US" b="1" i="1" dirty="0">
                 <a:solidFill>
                   <a:srgbClr val="FF0000"/>
                 </a:solidFill>
@@ -8032,7 +8013,7 @@
               <a:t>statement 1</a:t>
             </a:r>
             <a:r>
-              <a:rPr lang="en-US" b="1" dirty="0" smtClean="0">
+              <a:rPr lang="en-US" b="1" dirty="0">
                 <a:solidFill>
                   <a:srgbClr val="FF0000"/>
                 </a:solidFill>
@@ -8041,7 +8022,7 @@
               <a:t>;</a:t>
             </a:r>
             <a:r>
-              <a:rPr lang="en-US" b="1" i="1" dirty="0" smtClean="0">
+              <a:rPr lang="en-US" b="1" i="1" dirty="0">
                 <a:solidFill>
                   <a:srgbClr val="FF0000"/>
                 </a:solidFill>
@@ -8050,7 +8031,7 @@
               <a:t> statement 2</a:t>
             </a:r>
             <a:r>
-              <a:rPr lang="en-US" b="1" dirty="0" smtClean="0">
+              <a:rPr lang="en-US" b="1" dirty="0">
                 <a:solidFill>
                   <a:srgbClr val="FF0000"/>
                 </a:solidFill>
@@ -8059,7 +8040,7 @@
               <a:t>;</a:t>
             </a:r>
             <a:r>
-              <a:rPr lang="en-US" b="1" i="1" dirty="0" smtClean="0">
+              <a:rPr lang="en-US" b="1" i="1" dirty="0">
                 <a:solidFill>
                   <a:srgbClr val="FF0000"/>
                 </a:solidFill>
@@ -8068,22 +8049,10 @@
               <a:t> statement 3</a:t>
             </a:r>
             <a:r>
-              <a:rPr lang="en-US" dirty="0" smtClean="0">
-                <a:latin typeface="Consolas" panose="020B0609020204030204" pitchFamily="49" charset="0"/>
-              </a:rPr>
-              <a:t>) </a:t>
-            </a:r>
-            <a:r>
               <a:rPr lang="en-US" dirty="0">
                 <a:latin typeface="Consolas" panose="020B0609020204030204" pitchFamily="49" charset="0"/>
               </a:rPr>
-              <a:t>{</a:t>
-            </a:r>
-            <a:r>
-              <a:rPr lang="en-US" sz="2000" dirty="0">
-                <a:latin typeface="Consolas" panose="020B0609020204030204" pitchFamily="49" charset="0"/>
-              </a:rPr>
-              <a:t/>
+              <a:t>) {</a:t>
             </a:r>
             <a:br>
               <a:rPr lang="en-US" sz="2000" dirty="0">
@@ -8097,22 +8066,10 @@
               <a:t>    </a:t>
             </a:r>
             <a:r>
-              <a:rPr lang="en-US" i="1" dirty="0" smtClean="0">
-                <a:latin typeface="Consolas" panose="020B0609020204030204" pitchFamily="49" charset="0"/>
-              </a:rPr>
-              <a:t>code </a:t>
-            </a:r>
-            <a:r>
               <a:rPr lang="en-US" i="1" dirty="0">
                 <a:latin typeface="Consolas" panose="020B0609020204030204" pitchFamily="49" charset="0"/>
               </a:rPr>
-              <a:t>block to be executed</a:t>
-            </a:r>
-            <a:r>
-              <a:rPr lang="en-US" sz="2000" dirty="0">
-                <a:latin typeface="Consolas" panose="020B0609020204030204" pitchFamily="49" charset="0"/>
-              </a:rPr>
-              <a:t/>
+              <a:t>code block to be executed</a:t>
             </a:r>
             <a:br>
               <a:rPr lang="en-US" sz="2000" dirty="0">
@@ -8120,7 +8077,7 @@
               </a:rPr>
             </a:br>
             <a:r>
-              <a:rPr lang="en-US" dirty="0" smtClean="0">
+              <a:rPr lang="en-US" dirty="0">
                 <a:latin typeface="Consolas" panose="020B0609020204030204" pitchFamily="49" charset="0"/>
               </a:rPr>
               <a:t>}</a:t>
@@ -8169,7 +8126,7 @@
             <a:pPr marL="0" indent="0">
               <a:buNone/>
             </a:pPr>
-            <a:endParaRPr lang="en-US" sz="2000" dirty="0" smtClean="0">
+            <a:endParaRPr lang="en-US" sz="2000" dirty="0">
               <a:latin typeface="Consolas" panose="020B0609020204030204" pitchFamily="49" charset="0"/>
               <a:cs typeface="Calibri" panose="020F0502020204030204" pitchFamily="34" charset="0"/>
             </a:endParaRPr>
@@ -8199,10 +8156,9 @@
           <a:lstStyle/>
           <a:p>
             <a:r>
-              <a:rPr lang="en-US" dirty="0" smtClean="0"/>
+              <a:rPr lang="en-US" dirty="0"/>
               <a:t>Muhammad Umar Ahmad</a:t>
             </a:r>
-            <a:endParaRPr lang="en-US" dirty="0"/>
           </a:p>
         </p:txBody>
       </p:sp>
@@ -8257,10 +8213,9 @@
           <a:lstStyle/>
           <a:p>
             <a:r>
-              <a:rPr lang="en-US" dirty="0" smtClean="0"/>
+              <a:rPr lang="en-US" dirty="0"/>
               <a:t>Booleans</a:t>
             </a:r>
-            <a:endParaRPr lang="en-US" dirty="0"/>
           </a:p>
         </p:txBody>
       </p:sp>
@@ -8303,37 +8258,24 @@
               <a:t>false</a:t>
             </a:r>
             <a:r>
-              <a:rPr lang="en-US" sz="2000" dirty="0" smtClean="0"/>
+              <a:rPr lang="en-US" sz="2000" dirty="0"/>
               <a:t>.</a:t>
             </a:r>
           </a:p>
           <a:p>
             <a:r>
-              <a:rPr lang="en-US" dirty="0" smtClean="0"/>
-              <a:t>Booleans </a:t>
-            </a:r>
-            <a:r>
               <a:rPr lang="en-US" dirty="0"/>
-              <a:t>aren't enclosed in </a:t>
-            </a:r>
-            <a:r>
-              <a:rPr lang="en-US" dirty="0" smtClean="0"/>
-              <a:t>quotes</a:t>
-            </a:r>
-            <a:r>
-              <a:rPr lang="en-US" sz="2000" dirty="0" smtClean="0"/>
+              <a:t>Booleans aren't enclosed in quotes</a:t>
+            </a:r>
+            <a:r>
+              <a:rPr lang="en-US" sz="2000" dirty="0"/>
               <a:t>.</a:t>
             </a:r>
-            <a:endParaRPr lang="en-US" sz="2000" dirty="0"/>
           </a:p>
           <a:p>
             <a:r>
               <a:rPr lang="en-US" dirty="0"/>
-              <a:t>Very often, in programming, you will need a data type that can only have one of two values, </a:t>
-            </a:r>
-            <a:r>
-              <a:rPr lang="en-US" dirty="0" smtClean="0"/>
-              <a:t>like:</a:t>
+              <a:t>Very often, in programming, you will need a data type that can only have one of two values, like:</a:t>
             </a:r>
           </a:p>
           <a:p>
@@ -8367,11 +8309,7 @@
             </a:r>
             <a:r>
               <a:rPr lang="en-US" b="1"/>
-              <a:t>/ </a:t>
-            </a:r>
-            <a:r>
-              <a:rPr lang="en-US" b="1" smtClean="0"/>
-              <a:t>FALSE</a:t>
+              <a:t>/ FALSE</a:t>
             </a:r>
             <a:endParaRPr lang="en-US" sz="2000" dirty="0">
               <a:latin typeface="Consolas" panose="020B0609020204030204" pitchFamily="49" charset="0"/>
@@ -8382,7 +8320,7 @@
             <a:pPr marL="0" indent="0">
               <a:buNone/>
             </a:pPr>
-            <a:endParaRPr lang="en-US" sz="2000" dirty="0" smtClean="0"/>
+            <a:endParaRPr lang="en-US" sz="2000" dirty="0"/>
           </a:p>
         </p:txBody>
       </p:sp>
@@ -8409,10 +8347,9 @@
           <a:lstStyle/>
           <a:p>
             <a:r>
-              <a:rPr lang="en-US" dirty="0" smtClean="0"/>
+              <a:rPr lang="en-US" dirty="0"/>
               <a:t>Muhammad Umar Ahmad</a:t>
             </a:r>
-            <a:endParaRPr lang="en-US" dirty="0"/>
           </a:p>
         </p:txBody>
       </p:sp>
@@ -8426,13 +8363,6 @@
   <p:clrMapOvr>
     <a:masterClrMapping/>
   </p:clrMapOvr>
-  <p:timing>
-    <p:tnLst>
-      <p:par>
-        <p:cTn id="1" dur="indefinite" restart="never" nodeType="tmRoot"/>
-      </p:par>
-    </p:tnLst>
-  </p:timing>
 </p:sld>
 </file>
 
@@ -8469,10 +8399,9 @@
           <a:lstStyle/>
           <a:p>
             <a:r>
-              <a:rPr lang="en-US" dirty="0" smtClean="0"/>
+              <a:rPr lang="en-US" dirty="0"/>
               <a:t>Thank you</a:t>
             </a:r>
-            <a:endParaRPr lang="en-US" dirty="0"/>
           </a:p>
         </p:txBody>
       </p:sp>
@@ -8518,10 +8447,9 @@
           <a:lstStyle/>
           <a:p>
             <a:r>
-              <a:rPr lang="en-US" dirty="0" smtClean="0"/>
+              <a:rPr lang="en-US" dirty="0"/>
               <a:t>Muhammad Umar Ahmad</a:t>
             </a:r>
-            <a:endParaRPr lang="en-US" dirty="0"/>
           </a:p>
         </p:txBody>
       </p:sp>
@@ -8571,10 +8499,9 @@
           <a:lstStyle/>
           <a:p>
             <a:r>
-              <a:rPr lang="en-US" dirty="0" smtClean="0"/>
+              <a:rPr lang="en-US" dirty="0"/>
               <a:t>JavaScript</a:t>
             </a:r>
-            <a:endParaRPr lang="en-US" dirty="0"/>
           </a:p>
         </p:txBody>
       </p:sp>
@@ -8594,10 +8521,9 @@
           <a:lstStyle/>
           <a:p>
             <a:r>
-              <a:rPr lang="en-US" dirty="0" smtClean="0"/>
+              <a:rPr lang="en-US" dirty="0"/>
               <a:t>Arrays, for loops and Booleans</a:t>
             </a:r>
-            <a:endParaRPr lang="en-US" dirty="0"/>
           </a:p>
         </p:txBody>
       </p:sp>
@@ -8624,10 +8550,9 @@
           <a:lstStyle/>
           <a:p>
             <a:r>
-              <a:rPr lang="en-US" dirty="0" smtClean="0"/>
+              <a:rPr lang="en-US" dirty="0"/>
               <a:t>Muhammad Umar Ahmad</a:t>
             </a:r>
-            <a:endParaRPr lang="en-US" dirty="0"/>
           </a:p>
         </p:txBody>
       </p:sp>
@@ -8641,13 +8566,6 @@
   <p:clrMapOvr>
     <a:masterClrMapping/>
   </p:clrMapOvr>
-  <p:timing>
-    <p:tnLst>
-      <p:par>
-        <p:cTn id="1" dur="indefinite" restart="never" nodeType="tmRoot"/>
-      </p:par>
-    </p:tnLst>
-  </p:timing>
 </p:sld>
 </file>
 
@@ -8689,10 +8607,9 @@
           <a:lstStyle/>
           <a:p>
             <a:r>
-              <a:rPr lang="en-US" dirty="0" smtClean="0"/>
+              <a:rPr lang="en-US" dirty="0"/>
               <a:t>Arrays</a:t>
             </a:r>
-            <a:endParaRPr lang="en-US" dirty="0"/>
           </a:p>
         </p:txBody>
       </p:sp>
@@ -8720,28 +8637,12 @@
           <a:p>
             <a:r>
               <a:rPr lang="en-US" sz="2400" dirty="0"/>
-              <a:t>A</a:t>
-            </a:r>
-            <a:r>
-              <a:rPr lang="en-US" sz="2400" dirty="0" smtClean="0"/>
-              <a:t>n </a:t>
-            </a:r>
-            <a:r>
-              <a:rPr lang="en-US" sz="2400" dirty="0"/>
-              <a:t>array is a variable that can have multiple values assigned to </a:t>
-            </a:r>
-            <a:r>
-              <a:rPr lang="en-US" sz="2400" dirty="0" smtClean="0"/>
-              <a:t>it.</a:t>
-            </a:r>
-            <a:r>
-              <a:rPr lang="en-US" sz="2400" dirty="0"/>
-              <a:t/>
+              <a:t>An array is a variable that can have multiple values assigned to it.</a:t>
             </a:r>
             <a:br>
               <a:rPr lang="en-US" sz="2400" dirty="0"/>
             </a:br>
-            <a:endParaRPr lang="en-US" sz="2400" dirty="0" smtClean="0"/>
+            <a:endParaRPr lang="en-US" sz="2400" dirty="0"/>
           </a:p>
           <a:p>
             <a:pPr marL="0" indent="0">
@@ -8766,7 +8667,7 @@
             <a:pPr marL="0" indent="0">
               <a:buNone/>
             </a:pPr>
-            <a:endParaRPr lang="en-US" sz="2400" dirty="0" smtClean="0"/>
+            <a:endParaRPr lang="en-US" sz="2400" dirty="0"/>
           </a:p>
         </p:txBody>
       </p:sp>
@@ -8793,10 +8694,9 @@
           <a:lstStyle/>
           <a:p>
             <a:r>
-              <a:rPr lang="en-US" dirty="0" smtClean="0"/>
+              <a:rPr lang="en-US" dirty="0"/>
               <a:t>Muhammad Umar Ahmad</a:t>
             </a:r>
-            <a:endParaRPr lang="en-US" dirty="0"/>
           </a:p>
         </p:txBody>
       </p:sp>
@@ -8810,13 +8710,6 @@
   <p:clrMapOvr>
     <a:masterClrMapping/>
   </p:clrMapOvr>
-  <p:timing>
-    <p:tnLst>
-      <p:par>
-        <p:cTn id="1" dur="indefinite" restart="never" nodeType="tmRoot"/>
-      </p:par>
-    </p:tnLst>
-  </p:timing>
 </p:sld>
 </file>
 
@@ -8858,10 +8751,9 @@
           <a:lstStyle/>
           <a:p>
             <a:r>
-              <a:rPr lang="en-US" dirty="0" smtClean="0"/>
+              <a:rPr lang="en-US" dirty="0"/>
               <a:t>Defining an Array</a:t>
             </a:r>
-            <a:endParaRPr lang="en-US" dirty="0"/>
           </a:p>
         </p:txBody>
       </p:sp>
@@ -8891,21 +8783,17 @@
               <a:buNone/>
             </a:pPr>
             <a:r>
-              <a:rPr lang="en-US" sz="2400" dirty="0" smtClean="0"/>
+              <a:rPr lang="en-US" sz="2400" dirty="0"/>
               <a:t>Defining an array is simple like you define a variable</a:t>
-            </a:r>
-            <a:r>
-              <a:rPr lang="en-US" sz="2400" dirty="0"/>
-              <a:t/>
             </a:r>
             <a:br>
               <a:rPr lang="en-US" sz="2400" dirty="0"/>
             </a:br>
-            <a:endParaRPr lang="en-US" sz="2400" dirty="0" smtClean="0"/>
-          </a:p>
-          <a:p>
-            <a:r>
-              <a:rPr lang="en-US" sz="2000" dirty="0" smtClean="0"/>
+            <a:endParaRPr lang="en-US" sz="2400" dirty="0"/>
+          </a:p>
+          <a:p>
+            <a:r>
+              <a:rPr lang="en-US" sz="2000" dirty="0"/>
               <a:t>Blank array</a:t>
             </a:r>
           </a:p>
@@ -8914,14 +8802,14 @@
               <a:buNone/>
             </a:pPr>
             <a:r>
-              <a:rPr lang="en-US" sz="2000" dirty="0" err="1" smtClean="0">
+              <a:rPr lang="en-US" sz="2000" dirty="0" err="1">
                 <a:latin typeface="Consolas" panose="020B0609020204030204" pitchFamily="49" charset="0"/>
                 <a:cs typeface="Calibri" panose="020F0502020204030204" pitchFamily="34" charset="0"/>
               </a:rPr>
               <a:t>var</a:t>
             </a:r>
             <a:r>
-              <a:rPr lang="en-US" sz="2000" dirty="0" smtClean="0">
+              <a:rPr lang="en-US" sz="2000" dirty="0">
                 <a:latin typeface="Consolas" panose="020B0609020204030204" pitchFamily="49" charset="0"/>
                 <a:cs typeface="Calibri" panose="020F0502020204030204" pitchFamily="34" charset="0"/>
               </a:rPr>
@@ -8939,10 +8827,9 @@
           </a:p>
           <a:p>
             <a:r>
-              <a:rPr lang="en-US" sz="2000" dirty="0" smtClean="0"/>
+              <a:rPr lang="en-US" sz="2000" dirty="0"/>
               <a:t>With values</a:t>
             </a:r>
-            <a:endParaRPr lang="en-US" sz="2000" dirty="0"/>
           </a:p>
           <a:p>
             <a:pPr marL="0" indent="0">
@@ -8960,14 +8847,7 @@
                 <a:latin typeface="Consolas" panose="020B0609020204030204" pitchFamily="49" charset="0"/>
                 <a:cs typeface="Calibri" panose="020F0502020204030204" pitchFamily="34" charset="0"/>
               </a:rPr>
-              <a:t> cities = </a:t>
-            </a:r>
-            <a:r>
-              <a:rPr lang="en-US" sz="2000" dirty="0" smtClean="0">
-                <a:latin typeface="Consolas" panose="020B0609020204030204" pitchFamily="49" charset="0"/>
-                <a:cs typeface="Calibri" panose="020F0502020204030204" pitchFamily="34" charset="0"/>
-              </a:rPr>
-              <a:t>[“Karachi”, “Lahore”, “Faisalabad”];</a:t>
+              <a:t> cities = [“Karachi”, “Lahore”, “Faisalabad”];</a:t>
             </a:r>
           </a:p>
           <a:p>
@@ -8981,12 +8861,8 @@
           </a:p>
           <a:p>
             <a:r>
-              <a:rPr lang="en-US" sz="2000" dirty="0" smtClean="0"/>
-              <a:t>Mixed </a:t>
-            </a:r>
-            <a:r>
               <a:rPr lang="en-US" sz="2000" dirty="0"/>
-              <a:t>values</a:t>
+              <a:t>Mixed values</a:t>
             </a:r>
           </a:p>
           <a:p>
@@ -9008,51 +8884,19 @@
               <a:t> </a:t>
             </a:r>
             <a:r>
-              <a:rPr lang="en-US" sz="2000" dirty="0" err="1" smtClean="0">
+              <a:rPr lang="en-US" sz="2000" dirty="0" err="1">
                 <a:latin typeface="Consolas" panose="020B0609020204030204" pitchFamily="49" charset="0"/>
                 <a:cs typeface="Calibri" panose="020F0502020204030204" pitchFamily="34" charset="0"/>
               </a:rPr>
               <a:t>mixedValues</a:t>
             </a:r>
             <a:r>
-              <a:rPr lang="en-US" sz="2000" dirty="0" smtClean="0">
-                <a:latin typeface="Consolas" panose="020B0609020204030204" pitchFamily="49" charset="0"/>
-                <a:cs typeface="Calibri" panose="020F0502020204030204" pitchFamily="34" charset="0"/>
-              </a:rPr>
-              <a:t> </a:t>
-            </a:r>
-            <a:r>
               <a:rPr lang="en-US" sz="2000" dirty="0">
                 <a:latin typeface="Consolas" panose="020B0609020204030204" pitchFamily="49" charset="0"/>
                 <a:cs typeface="Calibri" panose="020F0502020204030204" pitchFamily="34" charset="0"/>
               </a:rPr>
-              <a:t>= </a:t>
-            </a:r>
-            <a:r>
-              <a:rPr lang="en-US" sz="2000" dirty="0" smtClean="0">
-                <a:latin typeface="Consolas" panose="020B0609020204030204" pitchFamily="49" charset="0"/>
-                <a:cs typeface="Calibri" panose="020F0502020204030204" pitchFamily="34" charset="0"/>
-              </a:rPr>
-              <a:t>[1, </a:t>
-            </a:r>
-            <a:r>
-              <a:rPr lang="en-US" sz="2000" dirty="0">
-                <a:latin typeface="Consolas" panose="020B0609020204030204" pitchFamily="49" charset="0"/>
-                <a:cs typeface="Calibri" panose="020F0502020204030204" pitchFamily="34" charset="0"/>
-              </a:rPr>
-              <a:t>“Lahore”, “Faisalabad</a:t>
-            </a:r>
-            <a:r>
-              <a:rPr lang="en-US" sz="2000" dirty="0" smtClean="0">
-                <a:latin typeface="Consolas" panose="020B0609020204030204" pitchFamily="49" charset="0"/>
-                <a:cs typeface="Calibri" panose="020F0502020204030204" pitchFamily="34" charset="0"/>
-              </a:rPr>
-              <a:t>”];</a:t>
-            </a:r>
-            <a:endParaRPr lang="en-US" sz="2000" dirty="0">
-              <a:latin typeface="Consolas" panose="020B0609020204030204" pitchFamily="49" charset="0"/>
-              <a:cs typeface="Calibri" panose="020F0502020204030204" pitchFamily="34" charset="0"/>
-            </a:endParaRPr>
+              <a:t> = [1, “Lahore”, “Faisalabad”];</a:t>
+            </a:r>
           </a:p>
           <a:p>
             <a:pPr marL="0" indent="0">
@@ -9088,10 +8932,9 @@
           <a:lstStyle/>
           <a:p>
             <a:r>
-              <a:rPr lang="en-US" dirty="0" smtClean="0"/>
+              <a:rPr lang="en-US" dirty="0"/>
               <a:t>Muhammad Umar Ahmad</a:t>
             </a:r>
-            <a:endParaRPr lang="en-US" dirty="0"/>
           </a:p>
         </p:txBody>
       </p:sp>
@@ -9105,13 +8948,6 @@
   <p:clrMapOvr>
     <a:masterClrMapping/>
   </p:clrMapOvr>
-  <p:timing>
-    <p:tnLst>
-      <p:par>
-        <p:cTn id="1" dur="indefinite" restart="never" nodeType="tmRoot"/>
-      </p:par>
-    </p:tnLst>
-  </p:timing>
 </p:sld>
 </file>
 
@@ -9199,38 +9035,31 @@
             <a:br>
               <a:rPr lang="en-US" sz="2000" dirty="0"/>
             </a:br>
-            <a:endParaRPr lang="en-US" sz="2000" dirty="0" smtClean="0"/>
+            <a:endParaRPr lang="en-US" sz="2000" dirty="0"/>
           </a:p>
           <a:p>
             <a:pPr marL="0" indent="0">
               <a:buNone/>
             </a:pPr>
-            <a:endParaRPr lang="en-US" sz="2000" dirty="0" smtClean="0"/>
+            <a:endParaRPr lang="en-US" sz="2000" dirty="0"/>
           </a:p>
           <a:p>
             <a:pPr marL="0" indent="0">
               <a:buNone/>
             </a:pPr>
             <a:r>
-              <a:rPr lang="en-US" sz="2000" dirty="0" err="1" smtClean="0">
+              <a:rPr lang="en-US" sz="2000" dirty="0" err="1">
                 <a:latin typeface="Consolas" panose="020B0609020204030204" pitchFamily="49" charset="0"/>
                 <a:cs typeface="Calibri" panose="020F0502020204030204" pitchFamily="34" charset="0"/>
               </a:rPr>
               <a:t>var</a:t>
             </a:r>
             <a:r>
-              <a:rPr lang="en-US" sz="2000" dirty="0" smtClean="0">
-                <a:latin typeface="Consolas" panose="020B0609020204030204" pitchFamily="49" charset="0"/>
-                <a:cs typeface="Calibri" panose="020F0502020204030204" pitchFamily="34" charset="0"/>
-              </a:rPr>
-              <a:t> </a:t>
-            </a:r>
-            <a:r>
               <a:rPr lang="en-US" sz="2000" dirty="0">
                 <a:latin typeface="Consolas" panose="020B0609020204030204" pitchFamily="49" charset="0"/>
                 <a:cs typeface="Calibri" panose="020F0502020204030204" pitchFamily="34" charset="0"/>
               </a:rPr>
-              <a:t>cities = </a:t>
+              <a:t> cities = </a:t>
             </a:r>
             <a:r>
               <a:rPr lang="en-US" dirty="0"/>
@@ -9242,13 +9071,9 @@
             </a:r>
             <a:r>
               <a:rPr lang="en-US" dirty="0"/>
-              <a:t>" </a:t>
-            </a:r>
-            <a:r>
-              <a:rPr lang="en-US" dirty="0" smtClean="0"/>
-              <a:t>];</a:t>
-            </a:r>
-            <a:endParaRPr lang="en-US" sz="2000" dirty="0" smtClean="0">
+              <a:t>" ];</a:t>
+            </a:r>
+            <a:endParaRPr lang="en-US" sz="2000" dirty="0">
               <a:latin typeface="Consolas" panose="020B0609020204030204" pitchFamily="49" charset="0"/>
               <a:cs typeface="Calibri" panose="020F0502020204030204" pitchFamily="34" charset="0"/>
             </a:endParaRPr>
@@ -9258,11 +9083,25 @@
               <a:buNone/>
             </a:pPr>
             <a:r>
-              <a:rPr lang="en-US" sz="2000" dirty="0" smtClean="0">
+              <a:rPr lang="en-US" sz="2000" dirty="0">
                 <a:latin typeface="Consolas" panose="020B0609020204030204" pitchFamily="49" charset="0"/>
                 <a:cs typeface="Calibri" panose="020F0502020204030204" pitchFamily="34" charset="0"/>
               </a:rPr>
-              <a:t>alert( cities[1] );</a:t>
+              <a:t>alert( </a:t>
+            </a:r>
+            <a:r>
+              <a:rPr lang="en-US" sz="2000">
+                <a:latin typeface="Consolas" panose="020B0609020204030204" pitchFamily="49" charset="0"/>
+                <a:cs typeface="Calibri" panose="020F0502020204030204" pitchFamily="34" charset="0"/>
+              </a:rPr>
+              <a:t>cities[0] </a:t>
+            </a:r>
+            <a:r>
+              <a:rPr lang="en-US" sz="2000" dirty="0">
+                <a:latin typeface="Consolas" panose="020B0609020204030204" pitchFamily="49" charset="0"/>
+                <a:cs typeface="Calibri" panose="020F0502020204030204" pitchFamily="34" charset="0"/>
+              </a:rPr>
+              <a:t>);</a:t>
             </a:r>
           </a:p>
           <a:p>
@@ -9278,16 +9117,7 @@
             <a:pPr marL="0" indent="0" algn="ctr">
               <a:buNone/>
             </a:pPr>
-            <a:endParaRPr lang="en-US" sz="2000" dirty="0" smtClean="0">
-              <a:latin typeface="Consolas" panose="020B0609020204030204" pitchFamily="49" charset="0"/>
-              <a:cs typeface="Calibri" panose="020F0502020204030204" pitchFamily="34" charset="0"/>
-            </a:endParaRPr>
-          </a:p>
-          <a:p>
-            <a:pPr marL="0" indent="0" algn="ctr">
-              <a:buNone/>
-            </a:pPr>
-            <a:endParaRPr lang="en-US" sz="2000" dirty="0" smtClean="0">
+            <a:endParaRPr lang="en-US" sz="2000" dirty="0">
               <a:latin typeface="Consolas" panose="020B0609020204030204" pitchFamily="49" charset="0"/>
               <a:cs typeface="Calibri" panose="020F0502020204030204" pitchFamily="34" charset="0"/>
             </a:endParaRPr>
@@ -9302,56 +9132,25 @@
             </a:endParaRPr>
           </a:p>
           <a:p>
+            <a:pPr marL="0" indent="0" algn="ctr">
+              <a:buNone/>
+            </a:pPr>
+            <a:endParaRPr lang="en-US" sz="2000" dirty="0">
+              <a:latin typeface="Consolas" panose="020B0609020204030204" pitchFamily="49" charset="0"/>
+              <a:cs typeface="Calibri" panose="020F0502020204030204" pitchFamily="34" charset="0"/>
+            </a:endParaRPr>
+          </a:p>
+          <a:p>
             <a:pPr marL="0" indent="0">
               <a:buNone/>
             </a:pPr>
-            <a:r>
-              <a:rPr lang="en-US" sz="2000" b="1" dirty="0" smtClean="0">
-                <a:solidFill>
-                  <a:srgbClr val="FF0000"/>
-                </a:solidFill>
-              </a:rPr>
-              <a:t>*[</a:t>
-            </a:r>
             <a:r>
               <a:rPr lang="en-US" sz="2000" b="1" dirty="0">
                 <a:solidFill>
                   <a:srgbClr val="FF0000"/>
                 </a:solidFill>
               </a:rPr>
-              <a:t>0] is the first element in an array. [1] is the </a:t>
-            </a:r>
-            <a:r>
-              <a:rPr lang="en-US" sz="2000" b="1" dirty="0" smtClean="0">
-                <a:solidFill>
-                  <a:srgbClr val="FF0000"/>
-                </a:solidFill>
-              </a:rPr>
-              <a:t>second</a:t>
-            </a:r>
-            <a:r>
-              <a:rPr lang="en-US" sz="2000" b="1" dirty="0">
-                <a:solidFill>
-                  <a:srgbClr val="FF0000"/>
-                </a:solidFill>
-              </a:rPr>
-              <a:t> </a:t>
-            </a:r>
-            <a:r>
-              <a:rPr lang="en-US" sz="2000" b="1" dirty="0" smtClean="0">
-                <a:solidFill>
-                  <a:srgbClr val="FF0000"/>
-                </a:solidFill>
-              </a:rPr>
-              <a:t>and so on. </a:t>
-            </a:r>
-            <a:r>
-              <a:rPr lang="en-US" sz="2000" b="1" dirty="0">
-                <a:solidFill>
-                  <a:srgbClr val="FF0000"/>
-                </a:solidFill>
-              </a:rPr>
-              <a:t>Array indexes start with 0.</a:t>
+              <a:t>*[0] is the first element in an array. [1] is the second and so on. Array indexes start with 0.</a:t>
             </a:r>
             <a:endParaRPr lang="en-US" sz="2000" b="1" dirty="0">
               <a:solidFill>
@@ -9386,10 +9185,9 @@
           <a:lstStyle/>
           <a:p>
             <a:r>
-              <a:rPr lang="en-US" dirty="0" smtClean="0"/>
+              <a:rPr lang="en-US" dirty="0"/>
               <a:t>Muhammad Umar Ahmad</a:t>
             </a:r>
-            <a:endParaRPr lang="en-US" dirty="0"/>
           </a:p>
         </p:txBody>
       </p:sp>
@@ -9403,13 +9201,6 @@
   <p:clrMapOvr>
     <a:masterClrMapping/>
   </p:clrMapOvr>
-  <p:timing>
-    <p:tnLst>
-      <p:par>
-        <p:cTn id="1" dur="indefinite" restart="never" nodeType="tmRoot"/>
-      </p:par>
-    </p:tnLst>
-  </p:timing>
 </p:sld>
 </file>
 
@@ -9451,10 +9242,9 @@
           <a:lstStyle/>
           <a:p>
             <a:r>
-              <a:rPr lang="en-US" dirty="0" smtClean="0"/>
+              <a:rPr lang="en-US" dirty="0"/>
               <a:t>Adding elements into array</a:t>
             </a:r>
-            <a:endParaRPr lang="en-US" dirty="0"/>
           </a:p>
         </p:txBody>
       </p:sp>
@@ -9483,7 +9273,7 @@
             <a:pPr marL="0" indent="0">
               <a:buNone/>
             </a:pPr>
-            <a:endParaRPr lang="en-US" sz="2000" dirty="0" smtClean="0">
+            <a:endParaRPr lang="en-US" sz="2000" dirty="0">
               <a:latin typeface="Consolas" panose="020B0609020204030204" pitchFamily="49" charset="0"/>
               <a:cs typeface="Calibri" panose="020F0502020204030204" pitchFamily="34" charset="0"/>
             </a:endParaRPr>
@@ -9493,29 +9283,29 @@
               <a:buNone/>
             </a:pPr>
             <a:r>
-              <a:rPr lang="en-US" sz="2000" dirty="0" err="1" smtClean="0">
+              <a:rPr lang="en-US" sz="2000" dirty="0" err="1">
                 <a:latin typeface="Consolas" panose="020B0609020204030204" pitchFamily="49" charset="0"/>
                 <a:cs typeface="Calibri" panose="020F0502020204030204" pitchFamily="34" charset="0"/>
               </a:rPr>
               <a:t>var</a:t>
             </a:r>
             <a:r>
-              <a:rPr lang="en-US" sz="2000" dirty="0" smtClean="0">
+              <a:rPr lang="en-US" sz="2000" dirty="0">
                 <a:latin typeface="Consolas" panose="020B0609020204030204" pitchFamily="49" charset="0"/>
                 <a:cs typeface="Calibri" panose="020F0502020204030204" pitchFamily="34" charset="0"/>
               </a:rPr>
               <a:t> cities = </a:t>
             </a:r>
             <a:r>
-              <a:rPr lang="en-US" sz="2000" dirty="0" smtClean="0"/>
+              <a:rPr lang="en-US" sz="2000" dirty="0"/>
               <a:t>[ "Islamabad", "Karachi", "Lahore", "Peshawar", "</a:t>
             </a:r>
             <a:r>
-              <a:rPr lang="en-US" sz="2000" dirty="0" err="1" smtClean="0"/>
+              <a:rPr lang="en-US" sz="2000" dirty="0" err="1"/>
               <a:t>Queta</a:t>
             </a:r>
             <a:r>
-              <a:rPr lang="en-US" sz="2000" dirty="0" smtClean="0"/>
+              <a:rPr lang="en-US" sz="2000" dirty="0"/>
               <a:t>" ];</a:t>
             </a:r>
           </a:p>
@@ -9523,7 +9313,7 @@
             <a:pPr marL="0" indent="0">
               <a:buNone/>
             </a:pPr>
-            <a:endParaRPr lang="en-US" sz="2000" dirty="0" smtClean="0">
+            <a:endParaRPr lang="en-US" sz="2000" dirty="0">
               <a:latin typeface="Consolas" panose="020B0609020204030204" pitchFamily="49" charset="0"/>
               <a:cs typeface="Calibri" panose="020F0502020204030204" pitchFamily="34" charset="0"/>
             </a:endParaRPr>
@@ -9533,7 +9323,7 @@
               <a:buNone/>
             </a:pPr>
             <a:r>
-              <a:rPr lang="en-US" sz="2000" dirty="0" smtClean="0">
+              <a:rPr lang="en-US" sz="2000" dirty="0">
                 <a:latin typeface="Consolas" panose="020B0609020204030204" pitchFamily="49" charset="0"/>
                 <a:cs typeface="Calibri" panose="020F0502020204030204" pitchFamily="34" charset="0"/>
               </a:rPr>
@@ -9545,14 +9335,14 @@
               <a:buNone/>
             </a:pPr>
             <a:r>
-              <a:rPr lang="en-US" sz="2000" dirty="0" smtClean="0">
+              <a:rPr lang="en-US" sz="2000" dirty="0">
                 <a:latin typeface="Consolas" panose="020B0609020204030204" pitchFamily="49" charset="0"/>
                 <a:cs typeface="Calibri" panose="020F0502020204030204" pitchFamily="34" charset="0"/>
               </a:rPr>
               <a:t>cities[5] = </a:t>
             </a:r>
             <a:r>
-              <a:rPr lang="en-US" sz="2000" dirty="0" smtClean="0"/>
+              <a:rPr lang="en-US" sz="2000" dirty="0"/>
               <a:t>"Faisalabad";</a:t>
             </a:r>
             <a:endParaRPr lang="en-US" sz="2000" dirty="0">
@@ -9565,29 +9355,22 @@
               <a:buNone/>
             </a:pPr>
             <a:r>
-              <a:rPr lang="en-US" sz="2000" dirty="0" smtClean="0">
-                <a:latin typeface="Consolas" panose="020B0609020204030204" pitchFamily="49" charset="0"/>
-                <a:cs typeface="Calibri" panose="020F0502020204030204" pitchFamily="34" charset="0"/>
-              </a:rPr>
-              <a:t>cities[10] </a:t>
-            </a:r>
-            <a:r>
               <a:rPr lang="en-US" sz="2000" dirty="0">
                 <a:latin typeface="Consolas" panose="020B0609020204030204" pitchFamily="49" charset="0"/>
                 <a:cs typeface="Calibri" panose="020F0502020204030204" pitchFamily="34" charset="0"/>
               </a:rPr>
-              <a:t>= </a:t>
-            </a:r>
-            <a:r>
-              <a:rPr lang="en-US" sz="2000" dirty="0" smtClean="0"/>
+              <a:t>cities[10] = </a:t>
+            </a:r>
+            <a:r>
+              <a:rPr lang="en-US" sz="2000" dirty="0"/>
               <a:t>"</a:t>
             </a:r>
             <a:r>
-              <a:rPr lang="en-US" sz="2000" dirty="0" err="1" smtClean="0"/>
+              <a:rPr lang="en-US" sz="2000" dirty="0" err="1"/>
               <a:t>Jhang</a:t>
             </a:r>
             <a:r>
-              <a:rPr lang="en-US" sz="2000" dirty="0" smtClean="0"/>
+              <a:rPr lang="en-US" sz="2000" dirty="0"/>
               <a:t>";</a:t>
             </a:r>
           </a:p>
@@ -9602,7 +9385,7 @@
               <a:buNone/>
             </a:pPr>
             <a:r>
-              <a:rPr lang="en-US" sz="2000" dirty="0" smtClean="0"/>
+              <a:rPr lang="en-US" sz="2000" dirty="0"/>
               <a:t>//Adding Elements to the end of array</a:t>
             </a:r>
           </a:p>
@@ -9611,33 +9394,33 @@
               <a:buNone/>
             </a:pPr>
             <a:r>
-              <a:rPr lang="en-US" sz="2000" dirty="0" err="1" smtClean="0">
+              <a:rPr lang="en-US" sz="2000" dirty="0" err="1">
                 <a:latin typeface="Consolas" panose="020B0609020204030204" pitchFamily="49" charset="0"/>
                 <a:cs typeface="Calibri" panose="020F0502020204030204" pitchFamily="34" charset="0"/>
               </a:rPr>
               <a:t>cities.push</a:t>
             </a:r>
             <a:r>
-              <a:rPr lang="en-US" sz="2000" dirty="0" smtClean="0">
+              <a:rPr lang="en-US" sz="2000" dirty="0">
                 <a:latin typeface="Consolas" panose="020B0609020204030204" pitchFamily="49" charset="0"/>
                 <a:cs typeface="Calibri" panose="020F0502020204030204" pitchFamily="34" charset="0"/>
               </a:rPr>
               <a:t>( </a:t>
             </a:r>
             <a:r>
-              <a:rPr lang="en-US" sz="2000" dirty="0" smtClean="0"/>
+              <a:rPr lang="en-US" sz="2000" dirty="0"/>
               <a:t>"</a:t>
             </a:r>
             <a:r>
-              <a:rPr lang="en-US" sz="2000" dirty="0" err="1" smtClean="0"/>
+              <a:rPr lang="en-US" sz="2000" dirty="0" err="1"/>
               <a:t>Chiniot</a:t>
             </a:r>
             <a:r>
-              <a:rPr lang="en-US" sz="2000" dirty="0" smtClean="0"/>
+              <a:rPr lang="en-US" sz="2000" dirty="0"/>
               <a:t>", "Multan"  </a:t>
             </a:r>
             <a:r>
-              <a:rPr lang="en-US" sz="2000" dirty="0" smtClean="0">
+              <a:rPr lang="en-US" sz="2000" dirty="0">
                 <a:latin typeface="Consolas" panose="020B0609020204030204" pitchFamily="49" charset="0"/>
                 <a:cs typeface="Calibri" panose="020F0502020204030204" pitchFamily="34" charset="0"/>
               </a:rPr>
@@ -9648,7 +9431,7 @@
             <a:pPr marL="0" indent="0">
               <a:buNone/>
             </a:pPr>
-            <a:endParaRPr lang="en-US" sz="2000" dirty="0" smtClean="0">
+            <a:endParaRPr lang="en-US" sz="2000" dirty="0">
               <a:latin typeface="Consolas" panose="020B0609020204030204" pitchFamily="49" charset="0"/>
               <a:cs typeface="Calibri" panose="020F0502020204030204" pitchFamily="34" charset="0"/>
             </a:endParaRPr>
@@ -9659,23 +9442,7 @@
             </a:pPr>
             <a:r>
               <a:rPr lang="en-US" sz="2000" dirty="0"/>
-              <a:t>//Adding Elements </a:t>
-            </a:r>
-            <a:r>
-              <a:rPr lang="en-US" sz="2000" dirty="0" smtClean="0"/>
-              <a:t>to </a:t>
-            </a:r>
-            <a:r>
-              <a:rPr lang="en-US" sz="2000" dirty="0"/>
-              <a:t>the </a:t>
-            </a:r>
-            <a:r>
-              <a:rPr lang="en-US" sz="2000" dirty="0" smtClean="0"/>
-              <a:t>beginning </a:t>
-            </a:r>
-            <a:r>
-              <a:rPr lang="en-US" sz="2000" dirty="0"/>
-              <a:t>of array</a:t>
+              <a:t>//Adding Elements to the beginning of array</a:t>
             </a:r>
           </a:p>
           <a:p>
@@ -9683,14 +9450,14 @@
               <a:buNone/>
             </a:pPr>
             <a:r>
-              <a:rPr lang="en-US" sz="2000" dirty="0" err="1" smtClean="0">
+              <a:rPr lang="en-US" sz="2000" dirty="0" err="1">
                 <a:latin typeface="Consolas" panose="020B0609020204030204" pitchFamily="49" charset="0"/>
                 <a:cs typeface="Calibri" panose="020F0502020204030204" pitchFamily="34" charset="0"/>
               </a:rPr>
               <a:t>cities.unshift</a:t>
             </a:r>
             <a:r>
-              <a:rPr lang="en-US" sz="2000" dirty="0" smtClean="0">
+              <a:rPr lang="en-US" sz="2000" dirty="0">
                 <a:latin typeface="Consolas" panose="020B0609020204030204" pitchFamily="49" charset="0"/>
                 <a:cs typeface="Calibri" panose="020F0502020204030204" pitchFamily="34" charset="0"/>
               </a:rPr>
@@ -9750,10 +9517,9 @@
           <a:lstStyle/>
           <a:p>
             <a:r>
-              <a:rPr lang="en-US" dirty="0" smtClean="0"/>
+              <a:rPr lang="en-US" dirty="0"/>
               <a:t>Muhammad Umar Ahmad</a:t>
             </a:r>
-            <a:endParaRPr lang="en-US" dirty="0"/>
           </a:p>
         </p:txBody>
       </p:sp>
@@ -9767,13 +9533,6 @@
   <p:clrMapOvr>
     <a:masterClrMapping/>
   </p:clrMapOvr>
-  <p:timing>
-    <p:tnLst>
-      <p:par>
-        <p:cTn id="1" dur="indefinite" restart="never" nodeType="tmRoot"/>
-      </p:par>
-    </p:tnLst>
-  </p:timing>
 </p:sld>
 </file>
 
@@ -9815,10 +9574,9 @@
           <a:lstStyle/>
           <a:p>
             <a:r>
-              <a:rPr lang="en-US" dirty="0" smtClean="0"/>
+              <a:rPr lang="en-US" dirty="0"/>
               <a:t>Removing elements from array</a:t>
             </a:r>
-            <a:endParaRPr lang="en-US" dirty="0"/>
           </a:p>
         </p:txBody>
       </p:sp>
@@ -9847,7 +9605,7 @@
             <a:pPr marL="0" indent="0">
               <a:buNone/>
             </a:pPr>
-            <a:endParaRPr lang="en-US" sz="2000" dirty="0" smtClean="0">
+            <a:endParaRPr lang="en-US" sz="2000" dirty="0">
               <a:latin typeface="Consolas" panose="020B0609020204030204" pitchFamily="49" charset="0"/>
               <a:cs typeface="Calibri" panose="020F0502020204030204" pitchFamily="34" charset="0"/>
             </a:endParaRPr>
@@ -9857,68 +9615,30 @@
               <a:buNone/>
             </a:pPr>
             <a:r>
-              <a:rPr lang="en-US" sz="2000" dirty="0" err="1" smtClean="0">
+              <a:rPr lang="en-US" sz="2000" dirty="0" err="1">
                 <a:latin typeface="Consolas" panose="020B0609020204030204" pitchFamily="49" charset="0"/>
                 <a:cs typeface="Calibri" panose="020F0502020204030204" pitchFamily="34" charset="0"/>
               </a:rPr>
               <a:t>var</a:t>
             </a:r>
             <a:r>
-              <a:rPr lang="en-US" sz="2000" dirty="0" smtClean="0">
+              <a:rPr lang="en-US" sz="2000" dirty="0">
                 <a:latin typeface="Consolas" panose="020B0609020204030204" pitchFamily="49" charset="0"/>
                 <a:cs typeface="Calibri" panose="020F0502020204030204" pitchFamily="34" charset="0"/>
               </a:rPr>
               <a:t> cities = </a:t>
             </a:r>
             <a:r>
-              <a:rPr lang="en-US" sz="2000" dirty="0" smtClean="0"/>
+              <a:rPr lang="en-US" sz="2000" dirty="0"/>
               <a:t>[ "Islamabad", "Karachi", "Lahore", "Peshawar", "</a:t>
             </a:r>
             <a:r>
-              <a:rPr lang="en-US" sz="2000" dirty="0" err="1" smtClean="0"/>
+              <a:rPr lang="en-US" sz="2000" dirty="0" err="1"/>
               <a:t>Queta</a:t>
             </a:r>
             <a:r>
-              <a:rPr lang="en-US" sz="2000" dirty="0" smtClean="0"/>
+              <a:rPr lang="en-US" sz="2000" dirty="0"/>
               <a:t>" ];</a:t>
-            </a:r>
-          </a:p>
-          <a:p>
-            <a:pPr marL="0" indent="0">
-              <a:buNone/>
-            </a:pPr>
-            <a:endParaRPr lang="en-US" sz="2000" dirty="0" smtClean="0">
-              <a:latin typeface="Consolas" panose="020B0609020204030204" pitchFamily="49" charset="0"/>
-              <a:cs typeface="Calibri" panose="020F0502020204030204" pitchFamily="34" charset="0"/>
-            </a:endParaRPr>
-          </a:p>
-          <a:p>
-            <a:pPr marL="0" indent="0">
-              <a:buNone/>
-            </a:pPr>
-            <a:r>
-              <a:rPr lang="en-US" sz="2000" dirty="0" smtClean="0"/>
-              <a:t>//Removing last element of array</a:t>
-            </a:r>
-            <a:endParaRPr lang="en-US" sz="2000" dirty="0"/>
-          </a:p>
-          <a:p>
-            <a:pPr marL="0" indent="0">
-              <a:buNone/>
-            </a:pPr>
-            <a:r>
-              <a:rPr lang="en-US" sz="2000" dirty="0" err="1" smtClean="0">
-                <a:latin typeface="Consolas" panose="020B0609020204030204" pitchFamily="49" charset="0"/>
-                <a:cs typeface="Calibri" panose="020F0502020204030204" pitchFamily="34" charset="0"/>
-              </a:rPr>
-              <a:t>cities.pop</a:t>
-            </a:r>
-            <a:r>
-              <a:rPr lang="en-US" sz="2000" dirty="0" smtClean="0">
-                <a:latin typeface="Consolas" panose="020B0609020204030204" pitchFamily="49" charset="0"/>
-                <a:cs typeface="Calibri" panose="020F0502020204030204" pitchFamily="34" charset="0"/>
-              </a:rPr>
-              <a:t>();</a:t>
             </a:r>
           </a:p>
           <a:p>
@@ -9936,36 +9656,64 @@
             </a:pPr>
             <a:r>
               <a:rPr lang="en-US" sz="2000" dirty="0"/>
-              <a:t>//Removing </a:t>
-            </a:r>
-            <a:r>
-              <a:rPr lang="en-US" sz="2000" dirty="0" smtClean="0"/>
-              <a:t>first element of array</a:t>
-            </a:r>
-            <a:endParaRPr lang="en-US" sz="2000" dirty="0"/>
+              <a:t>//Removing last element of array</a:t>
+            </a:r>
           </a:p>
           <a:p>
             <a:pPr marL="0" indent="0">
               <a:buNone/>
             </a:pPr>
             <a:r>
-              <a:rPr lang="en-US" sz="2000" dirty="0" err="1" smtClean="0">
+              <a:rPr lang="en-US" sz="2000" dirty="0" err="1">
+                <a:latin typeface="Consolas" panose="020B0609020204030204" pitchFamily="49" charset="0"/>
+                <a:cs typeface="Calibri" panose="020F0502020204030204" pitchFamily="34" charset="0"/>
+              </a:rPr>
+              <a:t>cities.pop</a:t>
+            </a:r>
+            <a:r>
+              <a:rPr lang="en-US" sz="2000" dirty="0">
+                <a:latin typeface="Consolas" panose="020B0609020204030204" pitchFamily="49" charset="0"/>
+                <a:cs typeface="Calibri" panose="020F0502020204030204" pitchFamily="34" charset="0"/>
+              </a:rPr>
+              <a:t>();</a:t>
+            </a:r>
+          </a:p>
+          <a:p>
+            <a:pPr marL="0" indent="0">
+              <a:buNone/>
+            </a:pPr>
+            <a:endParaRPr lang="en-US" sz="2000" dirty="0">
+              <a:latin typeface="Consolas" panose="020B0609020204030204" pitchFamily="49" charset="0"/>
+              <a:cs typeface="Calibri" panose="020F0502020204030204" pitchFamily="34" charset="0"/>
+            </a:endParaRPr>
+          </a:p>
+          <a:p>
+            <a:pPr marL="0" indent="0">
+              <a:buNone/>
+            </a:pPr>
+            <a:r>
+              <a:rPr lang="en-US" sz="2000" dirty="0"/>
+              <a:t>//Removing first element of array</a:t>
+            </a:r>
+          </a:p>
+          <a:p>
+            <a:pPr marL="0" indent="0">
+              <a:buNone/>
+            </a:pPr>
+            <a:r>
+              <a:rPr lang="en-US" sz="2000" dirty="0" err="1">
                 <a:latin typeface="Consolas" panose="020B0609020204030204" pitchFamily="49" charset="0"/>
                 <a:cs typeface="Calibri" panose="020F0502020204030204" pitchFamily="34" charset="0"/>
               </a:rPr>
               <a:t>cities.shift</a:t>
             </a:r>
             <a:r>
-              <a:rPr lang="en-US" sz="2000" dirty="0" smtClean="0">
+              <a:rPr lang="en-US" sz="2000" dirty="0">
                 <a:latin typeface="Consolas" panose="020B0609020204030204" pitchFamily="49" charset="0"/>
                 <a:cs typeface="Calibri" panose="020F0502020204030204" pitchFamily="34" charset="0"/>
               </a:rPr>
               <a:t>();</a:t>
             </a:r>
-            <a:endParaRPr lang="en-US" sz="2000" dirty="0">
-              <a:latin typeface="Consolas" panose="020B0609020204030204" pitchFamily="49" charset="0"/>
-              <a:cs typeface="Calibri" panose="020F0502020204030204" pitchFamily="34" charset="0"/>
-            </a:endParaRPr>
           </a:p>
           <a:p>
             <a:pPr marL="0" indent="0">
@@ -10010,10 +9758,9 @@
           <a:lstStyle/>
           <a:p>
             <a:r>
-              <a:rPr lang="en-US" dirty="0" smtClean="0"/>
+              <a:rPr lang="en-US" dirty="0"/>
               <a:t>Muhammad Umar Ahmad</a:t>
             </a:r>
-            <a:endParaRPr lang="en-US" dirty="0"/>
           </a:p>
         </p:txBody>
       </p:sp>
@@ -10027,13 +9774,6 @@
   <p:clrMapOvr>
     <a:masterClrMapping/>
   </p:clrMapOvr>
-  <p:timing>
-    <p:tnLst>
-      <p:par>
-        <p:cTn id="1" dur="indefinite" restart="never" nodeType="tmRoot"/>
-      </p:par>
-    </p:tnLst>
-  </p:timing>
 </p:sld>
 </file>
 
@@ -10075,10 +9815,9 @@
           <a:lstStyle/>
           <a:p>
             <a:r>
-              <a:rPr lang="en-US" dirty="0" smtClean="0"/>
+              <a:rPr lang="en-US" dirty="0"/>
               <a:t>Array Splice</a:t>
             </a:r>
-            <a:endParaRPr lang="en-US" dirty="0"/>
           </a:p>
         </p:txBody>
       </p:sp>
@@ -10109,45 +9848,30 @@
             </a:pPr>
             <a:r>
               <a:rPr lang="en-US" sz="2000" dirty="0"/>
-              <a:t>Use the splice method to insert one or more elements anywhere in an array, </a:t>
-            </a:r>
-            <a:r>
-              <a:rPr lang="en-US" sz="2000" dirty="0" smtClean="0"/>
-              <a:t>while optionally </a:t>
-            </a:r>
-            <a:r>
-              <a:rPr lang="en-US" sz="2000" dirty="0"/>
-              <a:t>removing one or more elements that come after it. </a:t>
+              <a:t>Use the splice method to insert one or more elements anywhere in an array, while optionally removing one or more elements that come after it. </a:t>
             </a:r>
             <a:br>
               <a:rPr lang="en-US" sz="2000" dirty="0"/>
             </a:br>
-            <a:endParaRPr lang="en-US" sz="2000" dirty="0" smtClean="0"/>
+            <a:endParaRPr lang="en-US" sz="2000" dirty="0"/>
           </a:p>
           <a:p>
             <a:pPr marL="0" indent="0">
               <a:buNone/>
             </a:pPr>
             <a:r>
-              <a:rPr lang="en-US" sz="2000" dirty="0" err="1" smtClean="0">
+              <a:rPr lang="en-US" sz="2000" dirty="0" err="1">
                 <a:latin typeface="Consolas" panose="020B0609020204030204" pitchFamily="49" charset="0"/>
                 <a:cs typeface="Calibri" panose="020F0502020204030204" pitchFamily="34" charset="0"/>
               </a:rPr>
               <a:t>var</a:t>
             </a:r>
             <a:r>
-              <a:rPr lang="en-US" sz="2000" dirty="0" smtClean="0">
-                <a:latin typeface="Consolas" panose="020B0609020204030204" pitchFamily="49" charset="0"/>
-                <a:cs typeface="Calibri" panose="020F0502020204030204" pitchFamily="34" charset="0"/>
-              </a:rPr>
-              <a:t> </a:t>
-            </a:r>
-            <a:r>
               <a:rPr lang="en-US" sz="2000" dirty="0">
                 <a:latin typeface="Consolas" panose="020B0609020204030204" pitchFamily="49" charset="0"/>
                 <a:cs typeface="Calibri" panose="020F0502020204030204" pitchFamily="34" charset="0"/>
               </a:rPr>
-              <a:t>cities = </a:t>
+              <a:t> cities = </a:t>
             </a:r>
             <a:r>
               <a:rPr lang="en-US" sz="2000" dirty="0"/>
@@ -10159,11 +9883,7 @@
             </a:r>
             <a:r>
               <a:rPr lang="en-US" sz="2000" dirty="0"/>
-              <a:t>" </a:t>
-            </a:r>
-            <a:r>
-              <a:rPr lang="en-US" sz="2000" dirty="0" smtClean="0"/>
-              <a:t>];</a:t>
+              <a:t>" ];</a:t>
             </a:r>
           </a:p>
           <a:p>
@@ -10180,30 +9900,18 @@
               <a:buNone/>
             </a:pPr>
             <a:r>
-              <a:rPr lang="sv-SE" dirty="0" smtClean="0">
-                <a:latin typeface="Consolas" panose="020B0609020204030204" pitchFamily="49" charset="0"/>
-              </a:rPr>
-              <a:t>cities.splice( 2</a:t>
-            </a:r>
-            <a:r>
               <a:rPr lang="sv-SE" dirty="0">
                 <a:latin typeface="Consolas" panose="020B0609020204030204" pitchFamily="49" charset="0"/>
               </a:rPr>
-              <a:t>, 2, </a:t>
-            </a:r>
-            <a:r>
-              <a:rPr lang="sv-SE" dirty="0" smtClean="0">
-                <a:latin typeface="Consolas" panose="020B0609020204030204" pitchFamily="49" charset="0"/>
-              </a:rPr>
-              <a:t>"Faisalabad", "Multan" );</a:t>
-            </a:r>
-            <a:r>
-              <a:rPr lang="sv-SE" sz="2000" dirty="0" smtClean="0">
+              <a:t>cities.splice( 2, 2, "Faisalabad", "Multan" );</a:t>
+            </a:r>
+            <a:r>
+              <a:rPr lang="sv-SE" sz="2000" dirty="0">
                 <a:latin typeface="Consolas" panose="020B0609020204030204" pitchFamily="49" charset="0"/>
               </a:rPr>
               <a:t> </a:t>
             </a:r>
-            <a:endParaRPr lang="en-US" sz="2000" dirty="0" smtClean="0">
+            <a:endParaRPr lang="en-US" sz="2000" dirty="0">
               <a:latin typeface="Consolas" panose="020B0609020204030204" pitchFamily="49" charset="0"/>
               <a:cs typeface="Calibri" panose="020F0502020204030204" pitchFamily="34" charset="0"/>
             </a:endParaRPr>
@@ -10233,10 +9941,9 @@
           <a:lstStyle/>
           <a:p>
             <a:r>
-              <a:rPr lang="en-US" dirty="0" smtClean="0"/>
+              <a:rPr lang="en-US" dirty="0"/>
               <a:t>Muhammad Umar Ahmad</a:t>
             </a:r>
-            <a:endParaRPr lang="en-US" dirty="0"/>
           </a:p>
         </p:txBody>
       </p:sp>
@@ -10291,10 +9998,9 @@
           <a:lstStyle/>
           <a:p>
             <a:r>
-              <a:rPr lang="en-US" dirty="0" smtClean="0"/>
+              <a:rPr lang="en-US" dirty="0"/>
               <a:t>Array Slice</a:t>
             </a:r>
-            <a:endParaRPr lang="en-US" dirty="0"/>
           </a:p>
         </p:txBody>
       </p:sp>
@@ -10325,57 +10031,34 @@
             </a:pPr>
             <a:r>
               <a:rPr lang="en-US" dirty="0"/>
-              <a:t>Use the slice method to copy one or more consecutive elements in any position and </a:t>
-            </a:r>
-            <a:r>
-              <a:rPr lang="en-US" dirty="0" smtClean="0"/>
-              <a:t>put them </a:t>
-            </a:r>
-            <a:r>
-              <a:rPr lang="en-US" dirty="0"/>
-              <a:t>into a new </a:t>
-            </a:r>
-            <a:r>
-              <a:rPr lang="en-US" dirty="0" smtClean="0"/>
-              <a:t>array</a:t>
-            </a:r>
-            <a:r>
-              <a:rPr lang="en-US" sz="2000" dirty="0" smtClean="0"/>
+              <a:t>Use the slice method to copy one or more consecutive elements in any position and put them into a new array</a:t>
+            </a:r>
+            <a:r>
+              <a:rPr lang="en-US" sz="2000" dirty="0"/>
               <a:t>.</a:t>
-            </a:r>
-            <a:r>
-              <a:rPr lang="en-US" sz="2000" dirty="0"/>
-              <a:t/>
             </a:r>
             <a:br>
               <a:rPr lang="en-US" sz="2000" dirty="0"/>
             </a:br>
-            <a:endParaRPr lang="en-US" sz="2000" dirty="0" smtClean="0"/>
+            <a:endParaRPr lang="en-US" sz="2000" dirty="0"/>
           </a:p>
           <a:p>
             <a:pPr marL="0" indent="0">
               <a:buNone/>
             </a:pPr>
             <a:r>
-              <a:rPr lang="en-US" sz="2000" dirty="0" err="1" smtClean="0">
+              <a:rPr lang="en-US" sz="2000" dirty="0" err="1">
                 <a:latin typeface="Consolas" panose="020B0609020204030204" pitchFamily="49" charset="0"/>
                 <a:cs typeface="Calibri" panose="020F0502020204030204" pitchFamily="34" charset="0"/>
               </a:rPr>
               <a:t>var</a:t>
             </a:r>
             <a:r>
-              <a:rPr lang="en-US" sz="2000" dirty="0" smtClean="0">
-                <a:latin typeface="Consolas" panose="020B0609020204030204" pitchFamily="49" charset="0"/>
-                <a:cs typeface="Calibri" panose="020F0502020204030204" pitchFamily="34" charset="0"/>
-              </a:rPr>
-              <a:t> </a:t>
-            </a:r>
-            <a:r>
               <a:rPr lang="en-US" sz="2000" dirty="0">
                 <a:latin typeface="Consolas" panose="020B0609020204030204" pitchFamily="49" charset="0"/>
                 <a:cs typeface="Calibri" panose="020F0502020204030204" pitchFamily="34" charset="0"/>
               </a:rPr>
-              <a:t>cities = </a:t>
+              <a:t> cities = </a:t>
             </a:r>
             <a:r>
               <a:rPr lang="en-US" sz="2000" dirty="0"/>
@@ -10387,11 +10070,7 @@
             </a:r>
             <a:r>
               <a:rPr lang="en-US" sz="2000" dirty="0"/>
-              <a:t>" </a:t>
-            </a:r>
-            <a:r>
-              <a:rPr lang="en-US" sz="2000" dirty="0" smtClean="0"/>
-              <a:t>];</a:t>
+              <a:t>" ];</a:t>
             </a:r>
           </a:p>
           <a:p>
@@ -10408,28 +10087,10 @@
               <a:buNone/>
             </a:pPr>
             <a:r>
-              <a:rPr lang="sv-SE" dirty="0" smtClean="0">
-                <a:latin typeface="Consolas" panose="020B0609020204030204" pitchFamily="49" charset="0"/>
-              </a:rPr>
-              <a:t>var newCities = cities.slice( 2</a:t>
-            </a:r>
-            <a:r>
               <a:rPr lang="sv-SE" dirty="0">
                 <a:latin typeface="Consolas" panose="020B0609020204030204" pitchFamily="49" charset="0"/>
               </a:rPr>
-              <a:t>, 4</a:t>
-            </a:r>
-            <a:r>
-              <a:rPr lang="sv-SE" dirty="0" smtClean="0">
-                <a:latin typeface="Consolas" panose="020B0609020204030204" pitchFamily="49" charset="0"/>
-              </a:rPr>
-              <a:t> </a:t>
-            </a:r>
-            <a:r>
-              <a:rPr lang="sv-SE" dirty="0" smtClean="0">
-                <a:latin typeface="Consolas" panose="020B0609020204030204" pitchFamily="49" charset="0"/>
-              </a:rPr>
-              <a:t>);</a:t>
+              <a:t>var newCities = cities.slice( 2, 4 );</a:t>
             </a:r>
             <a:endParaRPr lang="sv-SE" sz="2000" dirty="0">
               <a:latin typeface="Consolas" panose="020B0609020204030204" pitchFamily="49" charset="0"/>
@@ -10439,7 +10100,7 @@
             <a:pPr marL="0" indent="0">
               <a:buNone/>
             </a:pPr>
-            <a:endParaRPr lang="sv-SE" sz="2000" dirty="0" smtClean="0">
+            <a:endParaRPr lang="sv-SE" sz="2000" dirty="0">
               <a:latin typeface="Consolas" panose="020B0609020204030204" pitchFamily="49" charset="0"/>
               <a:cs typeface="Calibri" panose="020F0502020204030204" pitchFamily="34" charset="0"/>
             </a:endParaRPr>
@@ -10449,7 +10110,7 @@
               <a:buNone/>
             </a:pPr>
             <a:r>
-              <a:rPr lang="en-US" sz="2000" dirty="0" smtClean="0">
+              <a:rPr lang="en-US" sz="2000" dirty="0">
                 <a:solidFill>
                   <a:srgbClr val="FF0000"/>
                 </a:solidFill>
@@ -10535,14 +10196,10 @@
               </a:rPr>
               <a:t> </a:t>
             </a:r>
-            <a:r>
-              <a:rPr lang="en-US" sz="2000" dirty="0"/>
-              <a:t/>
-            </a:r>
             <a:br>
               <a:rPr lang="en-US" sz="2000" dirty="0"/>
             </a:br>
-            <a:endParaRPr lang="en-US" sz="2000" dirty="0" smtClean="0">
+            <a:endParaRPr lang="en-US" sz="2000" dirty="0">
               <a:latin typeface="Consolas" panose="020B0609020204030204" pitchFamily="49" charset="0"/>
               <a:cs typeface="Calibri" panose="020F0502020204030204" pitchFamily="34" charset="0"/>
             </a:endParaRPr>
@@ -10572,10 +10229,9 @@
           <a:lstStyle/>
           <a:p>
             <a:r>
-              <a:rPr lang="en-US" dirty="0" smtClean="0"/>
+              <a:rPr lang="en-US" dirty="0"/>
               <a:t>Muhammad Umar Ahmad</a:t>
             </a:r>
-            <a:endParaRPr lang="en-US" dirty="0"/>
           </a:p>
         </p:txBody>
       </p:sp>

</xml_diff>